<commit_message>
Update Gamemode1 Sikuli and PPP
</commit_message>
<xml_diff>
--- a/Midterm-PPP.pptx
+++ b/Midterm-PPP.pptx
@@ -5008,11 +5008,7 @@
             </a:r>
             <a:r>
               <a:rPr lang="de-DE" dirty="0" err="1" smtClean="0"/>
-              <a:t>Use</a:t>
-            </a:r>
-            <a:r>
-              <a:rPr lang="de-DE" dirty="0" err="1" smtClean="0"/>
-              <a:t>Case</a:t>
+              <a:t>UseCase</a:t>
             </a:r>
             <a:r>
               <a:rPr lang="de-DE" dirty="0" smtClean="0"/>
@@ -5243,7 +5239,6 @@
               <a:rPr lang="de-DE" sz="1200" dirty="0" smtClean="0"/>
               <a:t>)</a:t>
             </a:r>
-            <a:endParaRPr lang="de-DE" sz="1200" dirty="0" smtClean="0"/>
           </a:p>
           <a:p>
             <a:r>
@@ -5579,7 +5574,7 @@
         </p:blipFill>
         <p:spPr bwMode="auto">
           <a:xfrm>
-            <a:off x="152400" y="1778000"/>
+            <a:off x="12700" y="1790700"/>
             <a:ext cx="4483100" cy="4327664"/>
           </a:xfrm>
           <a:prstGeom prst="rect">
@@ -5622,8 +5617,49 @@
         </p:blipFill>
         <p:spPr bwMode="auto">
           <a:xfrm>
-            <a:off x="4635500" y="1778000"/>
+            <a:off x="4432300" y="1803400"/>
             <a:ext cx="3327400" cy="4400048"/>
+          </a:xfrm>
+          <a:prstGeom prst="rect">
+            <a:avLst/>
+          </a:prstGeom>
+          <a:noFill/>
+          <a:extLst>
+            <a:ext uri="{909E8E84-426E-40DD-AFC4-6F175D3DCCD1}">
+              <a14:hiddenFill xmlns:a14="http://schemas.microsoft.com/office/drawing/2010/main">
+                <a:solidFill>
+                  <a:srgbClr val="FFFFFF"/>
+                </a:solidFill>
+              </a14:hiddenFill>
+            </a:ext>
+          </a:extLst>
+        </p:spPr>
+      </p:pic>
+      <p:pic>
+        <p:nvPicPr>
+          <p:cNvPr id="3" name="Picture 2" descr="C:\Users\mincekara\Desktop\2015-12-08 15_13_03-1 UseCase_Gamemode 1.docx - Microsoft Word.png"/>
+          <p:cNvPicPr>
+            <a:picLocks noChangeAspect="1" noChangeArrowheads="1"/>
+          </p:cNvPicPr>
+          <p:nvPr/>
+        </p:nvPicPr>
+        <p:blipFill>
+          <a:blip r:embed="rId4">
+            <a:extLst>
+              <a:ext uri="{28A0092B-C50C-407E-A947-70E740481C1C}">
+                <a14:useLocalDpi xmlns:a14="http://schemas.microsoft.com/office/drawing/2010/main" val="0"/>
+              </a:ext>
+            </a:extLst>
+          </a:blip>
+          <a:srcRect/>
+          <a:stretch>
+            <a:fillRect/>
+          </a:stretch>
+        </p:blipFill>
+        <p:spPr bwMode="auto">
+          <a:xfrm>
+            <a:off x="7899400" y="1828800"/>
+            <a:ext cx="4241800" cy="3893840"/>
           </a:xfrm>
           <a:prstGeom prst="rect">
             <a:avLst/>
@@ -6435,7 +6471,7 @@
   <a:extraClrSchemeLst/>
   <a:extLst>
     <a:ext uri="{05A4C25C-085E-4340-85A3-A5531E510DB2}">
-      <thm15:themeFamily xmlns="" xmlns:thm15="http://schemas.microsoft.com/office/thememl/2012/main" name="Retrospect" id="{5F128B03-DCCA-4EEB-AB3B-CF2899314A46}" vid="{3F1AAB62-24C6-49D2-8E01-B56FAC9A3DCD}"/>
+      <thm15:themeFamily xmlns:thm15="http://schemas.microsoft.com/office/thememl/2012/main" xmlns="" name="Retrospect" id="{5F128B03-DCCA-4EEB-AB3B-CF2899314A46}" vid="{3F1AAB62-24C6-49D2-8E01-B56FAC9A3DCD}"/>
     </a:ext>
   </a:extLst>
 </a:theme>
@@ -6696,7 +6732,7 @@
   <a:extraClrSchemeLst/>
   <a:extLst>
     <a:ext uri="{05A4C25C-085E-4340-85A3-A5531E510DB2}">
-      <thm15:themeFamily xmlns="" xmlns:thm15="http://schemas.microsoft.com/office/thememl/2012/main" name="Office Theme" id="{62F939B6-93AF-4DB8-9C6B-D6C7DFDC589F}" vid="{4A3C46E8-61CC-4603-A589-7422A47A8E4A}"/>
+      <thm15:themeFamily xmlns:thm15="http://schemas.microsoft.com/office/thememl/2012/main" xmlns="" name="Office Theme" id="{62F939B6-93AF-4DB8-9C6B-D6C7DFDC589F}" vid="{4A3C46E8-61CC-4603-A589-7422A47A8E4A}"/>
     </a:ext>
   </a:extLst>
 </a:theme>

</xml_diff>

<commit_message>
Update PPP and UC 1
</commit_message>
<xml_diff>
--- a/Midterm-PPP.pptx
+++ b/Midterm-PPP.pptx
@@ -5,7 +5,7 @@
     <p:sldMasterId id="2147483684" r:id="rId1"/>
   </p:sldMasterIdLst>
   <p:notesMasterIdLst>
-    <p:notesMasterId r:id="rId13"/>
+    <p:notesMasterId r:id="rId17"/>
   </p:notesMasterIdLst>
   <p:sldIdLst>
     <p:sldId id="256" r:id="rId2"/>
@@ -13,12 +13,16 @@
     <p:sldId id="258" r:id="rId4"/>
     <p:sldId id="259" r:id="rId5"/>
     <p:sldId id="260" r:id="rId6"/>
-    <p:sldId id="261" r:id="rId7"/>
-    <p:sldId id="262" r:id="rId8"/>
-    <p:sldId id="263" r:id="rId9"/>
-    <p:sldId id="264" r:id="rId10"/>
-    <p:sldId id="268" r:id="rId11"/>
-    <p:sldId id="269" r:id="rId12"/>
+    <p:sldId id="270" r:id="rId7"/>
+    <p:sldId id="261" r:id="rId8"/>
+    <p:sldId id="262" r:id="rId9"/>
+    <p:sldId id="271" r:id="rId10"/>
+    <p:sldId id="272" r:id="rId11"/>
+    <p:sldId id="263" r:id="rId12"/>
+    <p:sldId id="264" r:id="rId13"/>
+    <p:sldId id="268" r:id="rId14"/>
+    <p:sldId id="273" r:id="rId15"/>
+    <p:sldId id="269" r:id="rId16"/>
   </p:sldIdLst>
   <p:sldSz cx="12192000" cy="6858000"/>
   <p:notesSz cx="6858000" cy="9144000"/>
@@ -468,6 +472,886 @@
     </a:lvl9pPr>
   </p:notesStyle>
 </p:notesMaster>
+</file>
+
+<file path=ppt/notesSlides/notesSlide1.xml><?xml version="1.0" encoding="utf-8"?>
+<p:notes xmlns:a="http://schemas.openxmlformats.org/drawingml/2006/main" xmlns:r="http://schemas.openxmlformats.org/officeDocument/2006/relationships" xmlns:p="http://schemas.openxmlformats.org/presentationml/2006/main">
+  <p:cSld>
+    <p:spTree>
+      <p:nvGrpSpPr>
+        <p:cNvPr id="1" name=""/>
+        <p:cNvGrpSpPr/>
+        <p:nvPr/>
+      </p:nvGrpSpPr>
+      <p:grpSpPr>
+        <a:xfrm>
+          <a:off x="0" y="0"/>
+          <a:ext cx="0" cy="0"/>
+          <a:chOff x="0" y="0"/>
+          <a:chExt cx="0" cy="0"/>
+        </a:xfrm>
+      </p:grpSpPr>
+      <p:sp>
+        <p:nvSpPr>
+          <p:cNvPr id="2" name="Folienbildplatzhalter 1"/>
+          <p:cNvSpPr>
+            <a:spLocks noGrp="1" noRot="1" noChangeAspect="1"/>
+          </p:cNvSpPr>
+          <p:nvPr>
+            <p:ph type="sldImg"/>
+          </p:nvPr>
+        </p:nvSpPr>
+        <p:spPr/>
+      </p:sp>
+      <p:sp>
+        <p:nvSpPr>
+          <p:cNvPr id="3" name="Notizenplatzhalter 2"/>
+          <p:cNvSpPr>
+            <a:spLocks noGrp="1"/>
+          </p:cNvSpPr>
+          <p:nvPr>
+            <p:ph type="body" idx="1"/>
+          </p:nvPr>
+        </p:nvSpPr>
+        <p:spPr/>
+        <p:txBody>
+          <a:bodyPr/>
+          <a:lstStyle/>
+          <a:p>
+            <a:r>
+              <a:rPr lang="de-DE" dirty="0" smtClean="0"/>
+              <a:t>MANU</a:t>
+            </a:r>
+            <a:endParaRPr lang="de-DE" dirty="0"/>
+          </a:p>
+        </p:txBody>
+      </p:sp>
+      <p:sp>
+        <p:nvSpPr>
+          <p:cNvPr id="4" name="Foliennummernplatzhalter 3"/>
+          <p:cNvSpPr>
+            <a:spLocks noGrp="1"/>
+          </p:cNvSpPr>
+          <p:nvPr>
+            <p:ph type="sldNum" sz="quarter" idx="10"/>
+          </p:nvPr>
+        </p:nvSpPr>
+        <p:spPr/>
+        <p:txBody>
+          <a:bodyPr/>
+          <a:lstStyle/>
+          <a:p>
+            <a:fld id="{4C40B096-980F-4B1D-B616-BA01D9772A24}" type="slidenum">
+              <a:rPr lang="de-DE" smtClean="0"/>
+              <a:t>3</a:t>
+            </a:fld>
+            <a:endParaRPr lang="de-DE"/>
+          </a:p>
+        </p:txBody>
+      </p:sp>
+    </p:spTree>
+    <p:extLst>
+      <p:ext uri="{BB962C8B-B14F-4D97-AF65-F5344CB8AC3E}">
+        <p14:creationId xmlns:p14="http://schemas.microsoft.com/office/powerpoint/2010/main" val="740053472"/>
+      </p:ext>
+    </p:extLst>
+  </p:cSld>
+  <p:clrMapOvr>
+    <a:masterClrMapping/>
+  </p:clrMapOvr>
+</p:notes>
+</file>
+
+<file path=ppt/notesSlides/notesSlide10.xml><?xml version="1.0" encoding="utf-8"?>
+<p:notes xmlns:a="http://schemas.openxmlformats.org/drawingml/2006/main" xmlns:r="http://schemas.openxmlformats.org/officeDocument/2006/relationships" xmlns:p="http://schemas.openxmlformats.org/presentationml/2006/main">
+  <p:cSld>
+    <p:spTree>
+      <p:nvGrpSpPr>
+        <p:cNvPr id="1" name=""/>
+        <p:cNvGrpSpPr/>
+        <p:nvPr/>
+      </p:nvGrpSpPr>
+      <p:grpSpPr>
+        <a:xfrm>
+          <a:off x="0" y="0"/>
+          <a:ext cx="0" cy="0"/>
+          <a:chOff x="0" y="0"/>
+          <a:chExt cx="0" cy="0"/>
+        </a:xfrm>
+      </p:grpSpPr>
+      <p:sp>
+        <p:nvSpPr>
+          <p:cNvPr id="2" name="Folienbildplatzhalter 1"/>
+          <p:cNvSpPr>
+            <a:spLocks noGrp="1" noRot="1" noChangeAspect="1"/>
+          </p:cNvSpPr>
+          <p:nvPr>
+            <p:ph type="sldImg"/>
+          </p:nvPr>
+        </p:nvSpPr>
+        <p:spPr/>
+      </p:sp>
+      <p:sp>
+        <p:nvSpPr>
+          <p:cNvPr id="3" name="Notizenplatzhalter 2"/>
+          <p:cNvSpPr>
+            <a:spLocks noGrp="1"/>
+          </p:cNvSpPr>
+          <p:nvPr>
+            <p:ph type="body" idx="1"/>
+          </p:nvPr>
+        </p:nvSpPr>
+        <p:spPr/>
+        <p:txBody>
+          <a:bodyPr/>
+          <a:lstStyle/>
+          <a:p>
+            <a:r>
+              <a:rPr lang="de-DE" dirty="0" smtClean="0"/>
+              <a:t>MANU</a:t>
+            </a:r>
+            <a:endParaRPr lang="de-DE" dirty="0"/>
+          </a:p>
+        </p:txBody>
+      </p:sp>
+      <p:sp>
+        <p:nvSpPr>
+          <p:cNvPr id="4" name="Foliennummernplatzhalter 3"/>
+          <p:cNvSpPr>
+            <a:spLocks noGrp="1"/>
+          </p:cNvSpPr>
+          <p:nvPr>
+            <p:ph type="sldNum" sz="quarter" idx="10"/>
+          </p:nvPr>
+        </p:nvSpPr>
+        <p:spPr/>
+        <p:txBody>
+          <a:bodyPr/>
+          <a:lstStyle/>
+          <a:p>
+            <a:fld id="{4C40B096-980F-4B1D-B616-BA01D9772A24}" type="slidenum">
+              <a:rPr lang="de-DE" smtClean="0"/>
+              <a:t>14</a:t>
+            </a:fld>
+            <a:endParaRPr lang="de-DE"/>
+          </a:p>
+        </p:txBody>
+      </p:sp>
+    </p:spTree>
+    <p:extLst>
+      <p:ext uri="{BB962C8B-B14F-4D97-AF65-F5344CB8AC3E}">
+        <p14:creationId xmlns:p14="http://schemas.microsoft.com/office/powerpoint/2010/main" val="3050164613"/>
+      </p:ext>
+    </p:extLst>
+  </p:cSld>
+  <p:clrMapOvr>
+    <a:masterClrMapping/>
+  </p:clrMapOvr>
+</p:notes>
+</file>
+
+<file path=ppt/notesSlides/notesSlide2.xml><?xml version="1.0" encoding="utf-8"?>
+<p:notes xmlns:a="http://schemas.openxmlformats.org/drawingml/2006/main" xmlns:r="http://schemas.openxmlformats.org/officeDocument/2006/relationships" xmlns:p="http://schemas.openxmlformats.org/presentationml/2006/main">
+  <p:cSld>
+    <p:spTree>
+      <p:nvGrpSpPr>
+        <p:cNvPr id="1" name=""/>
+        <p:cNvGrpSpPr/>
+        <p:nvPr/>
+      </p:nvGrpSpPr>
+      <p:grpSpPr>
+        <a:xfrm>
+          <a:off x="0" y="0"/>
+          <a:ext cx="0" cy="0"/>
+          <a:chOff x="0" y="0"/>
+          <a:chExt cx="0" cy="0"/>
+        </a:xfrm>
+      </p:grpSpPr>
+      <p:sp>
+        <p:nvSpPr>
+          <p:cNvPr id="2" name="Folienbildplatzhalter 1"/>
+          <p:cNvSpPr>
+            <a:spLocks noGrp="1" noRot="1" noChangeAspect="1"/>
+          </p:cNvSpPr>
+          <p:nvPr>
+            <p:ph type="sldImg"/>
+          </p:nvPr>
+        </p:nvSpPr>
+        <p:spPr/>
+      </p:sp>
+      <p:sp>
+        <p:nvSpPr>
+          <p:cNvPr id="3" name="Notizenplatzhalter 2"/>
+          <p:cNvSpPr>
+            <a:spLocks noGrp="1"/>
+          </p:cNvSpPr>
+          <p:nvPr>
+            <p:ph type="body" idx="1"/>
+          </p:nvPr>
+        </p:nvSpPr>
+        <p:spPr/>
+        <p:txBody>
+          <a:bodyPr/>
+          <a:lstStyle/>
+          <a:p>
+            <a:r>
+              <a:rPr lang="de-DE" dirty="0" smtClean="0"/>
+              <a:t>MARVIN</a:t>
+            </a:r>
+            <a:endParaRPr lang="de-DE" dirty="0"/>
+          </a:p>
+        </p:txBody>
+      </p:sp>
+      <p:sp>
+        <p:nvSpPr>
+          <p:cNvPr id="4" name="Foliennummernplatzhalter 3"/>
+          <p:cNvSpPr>
+            <a:spLocks noGrp="1"/>
+          </p:cNvSpPr>
+          <p:nvPr>
+            <p:ph type="sldNum" sz="quarter" idx="10"/>
+          </p:nvPr>
+        </p:nvSpPr>
+        <p:spPr/>
+        <p:txBody>
+          <a:bodyPr/>
+          <a:lstStyle/>
+          <a:p>
+            <a:fld id="{4C40B096-980F-4B1D-B616-BA01D9772A24}" type="slidenum">
+              <a:rPr lang="de-DE" smtClean="0"/>
+              <a:t>4</a:t>
+            </a:fld>
+            <a:endParaRPr lang="de-DE"/>
+          </a:p>
+        </p:txBody>
+      </p:sp>
+    </p:spTree>
+    <p:extLst>
+      <p:ext uri="{BB962C8B-B14F-4D97-AF65-F5344CB8AC3E}">
+        <p14:creationId xmlns:p14="http://schemas.microsoft.com/office/powerpoint/2010/main" val="4256659103"/>
+      </p:ext>
+    </p:extLst>
+  </p:cSld>
+  <p:clrMapOvr>
+    <a:masterClrMapping/>
+  </p:clrMapOvr>
+</p:notes>
+</file>
+
+<file path=ppt/notesSlides/notesSlide3.xml><?xml version="1.0" encoding="utf-8"?>
+<p:notes xmlns:a="http://schemas.openxmlformats.org/drawingml/2006/main" xmlns:r="http://schemas.openxmlformats.org/officeDocument/2006/relationships" xmlns:p="http://schemas.openxmlformats.org/presentationml/2006/main">
+  <p:cSld>
+    <p:spTree>
+      <p:nvGrpSpPr>
+        <p:cNvPr id="1" name=""/>
+        <p:cNvGrpSpPr/>
+        <p:nvPr/>
+      </p:nvGrpSpPr>
+      <p:grpSpPr>
+        <a:xfrm>
+          <a:off x="0" y="0"/>
+          <a:ext cx="0" cy="0"/>
+          <a:chOff x="0" y="0"/>
+          <a:chExt cx="0" cy="0"/>
+        </a:xfrm>
+      </p:grpSpPr>
+      <p:sp>
+        <p:nvSpPr>
+          <p:cNvPr id="2" name="Folienbildplatzhalter 1"/>
+          <p:cNvSpPr>
+            <a:spLocks noGrp="1" noRot="1" noChangeAspect="1"/>
+          </p:cNvSpPr>
+          <p:nvPr>
+            <p:ph type="sldImg"/>
+          </p:nvPr>
+        </p:nvSpPr>
+        <p:spPr/>
+      </p:sp>
+      <p:sp>
+        <p:nvSpPr>
+          <p:cNvPr id="3" name="Notizenplatzhalter 2"/>
+          <p:cNvSpPr>
+            <a:spLocks noGrp="1"/>
+          </p:cNvSpPr>
+          <p:nvPr>
+            <p:ph type="body" idx="1"/>
+          </p:nvPr>
+        </p:nvSpPr>
+        <p:spPr/>
+        <p:txBody>
+          <a:bodyPr/>
+          <a:lstStyle/>
+          <a:p>
+            <a:r>
+              <a:rPr lang="de-DE" dirty="0" smtClean="0"/>
+              <a:t>ALI</a:t>
+            </a:r>
+            <a:endParaRPr lang="de-DE" dirty="0"/>
+          </a:p>
+        </p:txBody>
+      </p:sp>
+      <p:sp>
+        <p:nvSpPr>
+          <p:cNvPr id="4" name="Foliennummernplatzhalter 3"/>
+          <p:cNvSpPr>
+            <a:spLocks noGrp="1"/>
+          </p:cNvSpPr>
+          <p:nvPr>
+            <p:ph type="sldNum" sz="quarter" idx="10"/>
+          </p:nvPr>
+        </p:nvSpPr>
+        <p:spPr/>
+        <p:txBody>
+          <a:bodyPr/>
+          <a:lstStyle/>
+          <a:p>
+            <a:fld id="{4C40B096-980F-4B1D-B616-BA01D9772A24}" type="slidenum">
+              <a:rPr lang="de-DE" smtClean="0"/>
+              <a:t>5</a:t>
+            </a:fld>
+            <a:endParaRPr lang="de-DE"/>
+          </a:p>
+        </p:txBody>
+      </p:sp>
+    </p:spTree>
+    <p:extLst>
+      <p:ext uri="{BB962C8B-B14F-4D97-AF65-F5344CB8AC3E}">
+        <p14:creationId xmlns:p14="http://schemas.microsoft.com/office/powerpoint/2010/main" val="287580073"/>
+      </p:ext>
+    </p:extLst>
+  </p:cSld>
+  <p:clrMapOvr>
+    <a:masterClrMapping/>
+  </p:clrMapOvr>
+</p:notes>
+</file>
+
+<file path=ppt/notesSlides/notesSlide4.xml><?xml version="1.0" encoding="utf-8"?>
+<p:notes xmlns:a="http://schemas.openxmlformats.org/drawingml/2006/main" xmlns:r="http://schemas.openxmlformats.org/officeDocument/2006/relationships" xmlns:p="http://schemas.openxmlformats.org/presentationml/2006/main">
+  <p:cSld>
+    <p:spTree>
+      <p:nvGrpSpPr>
+        <p:cNvPr id="1" name=""/>
+        <p:cNvGrpSpPr/>
+        <p:nvPr/>
+      </p:nvGrpSpPr>
+      <p:grpSpPr>
+        <a:xfrm>
+          <a:off x="0" y="0"/>
+          <a:ext cx="0" cy="0"/>
+          <a:chOff x="0" y="0"/>
+          <a:chExt cx="0" cy="0"/>
+        </a:xfrm>
+      </p:grpSpPr>
+      <p:sp>
+        <p:nvSpPr>
+          <p:cNvPr id="2" name="Folienbildplatzhalter 1"/>
+          <p:cNvSpPr>
+            <a:spLocks noGrp="1" noRot="1" noChangeAspect="1"/>
+          </p:cNvSpPr>
+          <p:nvPr>
+            <p:ph type="sldImg"/>
+          </p:nvPr>
+        </p:nvSpPr>
+        <p:spPr/>
+      </p:sp>
+      <p:sp>
+        <p:nvSpPr>
+          <p:cNvPr id="3" name="Notizenplatzhalter 2"/>
+          <p:cNvSpPr>
+            <a:spLocks noGrp="1"/>
+          </p:cNvSpPr>
+          <p:nvPr>
+            <p:ph type="body" idx="1"/>
+          </p:nvPr>
+        </p:nvSpPr>
+        <p:spPr/>
+        <p:txBody>
+          <a:bodyPr/>
+          <a:lstStyle/>
+          <a:p>
+            <a:r>
+              <a:rPr lang="de-DE" dirty="0" smtClean="0"/>
+              <a:t>ALI</a:t>
+            </a:r>
+            <a:endParaRPr lang="de-DE" dirty="0"/>
+          </a:p>
+        </p:txBody>
+      </p:sp>
+      <p:sp>
+        <p:nvSpPr>
+          <p:cNvPr id="4" name="Foliennummernplatzhalter 3"/>
+          <p:cNvSpPr>
+            <a:spLocks noGrp="1"/>
+          </p:cNvSpPr>
+          <p:nvPr>
+            <p:ph type="sldNum" sz="quarter" idx="10"/>
+          </p:nvPr>
+        </p:nvSpPr>
+        <p:spPr/>
+        <p:txBody>
+          <a:bodyPr/>
+          <a:lstStyle/>
+          <a:p>
+            <a:fld id="{4C40B096-980F-4B1D-B616-BA01D9772A24}" type="slidenum">
+              <a:rPr lang="de-DE" smtClean="0"/>
+              <a:t>6</a:t>
+            </a:fld>
+            <a:endParaRPr lang="de-DE"/>
+          </a:p>
+        </p:txBody>
+      </p:sp>
+    </p:spTree>
+    <p:extLst>
+      <p:ext uri="{BB962C8B-B14F-4D97-AF65-F5344CB8AC3E}">
+        <p14:creationId xmlns:p14="http://schemas.microsoft.com/office/powerpoint/2010/main" val="3589066905"/>
+      </p:ext>
+    </p:extLst>
+  </p:cSld>
+  <p:clrMapOvr>
+    <a:masterClrMapping/>
+  </p:clrMapOvr>
+</p:notes>
+</file>
+
+<file path=ppt/notesSlides/notesSlide5.xml><?xml version="1.0" encoding="utf-8"?>
+<p:notes xmlns:a="http://schemas.openxmlformats.org/drawingml/2006/main" xmlns:r="http://schemas.openxmlformats.org/officeDocument/2006/relationships" xmlns:p="http://schemas.openxmlformats.org/presentationml/2006/main">
+  <p:cSld>
+    <p:spTree>
+      <p:nvGrpSpPr>
+        <p:cNvPr id="1" name=""/>
+        <p:cNvGrpSpPr/>
+        <p:nvPr/>
+      </p:nvGrpSpPr>
+      <p:grpSpPr>
+        <a:xfrm>
+          <a:off x="0" y="0"/>
+          <a:ext cx="0" cy="0"/>
+          <a:chOff x="0" y="0"/>
+          <a:chExt cx="0" cy="0"/>
+        </a:xfrm>
+      </p:grpSpPr>
+      <p:sp>
+        <p:nvSpPr>
+          <p:cNvPr id="2" name="Folienbildplatzhalter 1"/>
+          <p:cNvSpPr>
+            <a:spLocks noGrp="1" noRot="1" noChangeAspect="1"/>
+          </p:cNvSpPr>
+          <p:nvPr>
+            <p:ph type="sldImg"/>
+          </p:nvPr>
+        </p:nvSpPr>
+        <p:spPr/>
+      </p:sp>
+      <p:sp>
+        <p:nvSpPr>
+          <p:cNvPr id="3" name="Notizenplatzhalter 2"/>
+          <p:cNvSpPr>
+            <a:spLocks noGrp="1"/>
+          </p:cNvSpPr>
+          <p:nvPr>
+            <p:ph type="body" idx="1"/>
+          </p:nvPr>
+        </p:nvSpPr>
+        <p:spPr/>
+        <p:txBody>
+          <a:bodyPr/>
+          <a:lstStyle/>
+          <a:p>
+            <a:r>
+              <a:rPr lang="de-DE" dirty="0" smtClean="0"/>
+              <a:t>ALI</a:t>
+            </a:r>
+            <a:endParaRPr lang="de-DE" dirty="0"/>
+          </a:p>
+        </p:txBody>
+      </p:sp>
+      <p:sp>
+        <p:nvSpPr>
+          <p:cNvPr id="4" name="Foliennummernplatzhalter 3"/>
+          <p:cNvSpPr>
+            <a:spLocks noGrp="1"/>
+          </p:cNvSpPr>
+          <p:nvPr>
+            <p:ph type="sldNum" sz="quarter" idx="10"/>
+          </p:nvPr>
+        </p:nvSpPr>
+        <p:spPr/>
+        <p:txBody>
+          <a:bodyPr/>
+          <a:lstStyle/>
+          <a:p>
+            <a:fld id="{4C40B096-980F-4B1D-B616-BA01D9772A24}" type="slidenum">
+              <a:rPr lang="de-DE" smtClean="0"/>
+              <a:t>7</a:t>
+            </a:fld>
+            <a:endParaRPr lang="de-DE"/>
+          </a:p>
+        </p:txBody>
+      </p:sp>
+    </p:spTree>
+    <p:extLst>
+      <p:ext uri="{BB962C8B-B14F-4D97-AF65-F5344CB8AC3E}">
+        <p14:creationId xmlns:p14="http://schemas.microsoft.com/office/powerpoint/2010/main" val="3497009384"/>
+      </p:ext>
+    </p:extLst>
+  </p:cSld>
+  <p:clrMapOvr>
+    <a:masterClrMapping/>
+  </p:clrMapOvr>
+</p:notes>
+</file>
+
+<file path=ppt/notesSlides/notesSlide6.xml><?xml version="1.0" encoding="utf-8"?>
+<p:notes xmlns:a="http://schemas.openxmlformats.org/drawingml/2006/main" xmlns:r="http://schemas.openxmlformats.org/officeDocument/2006/relationships" xmlns:p="http://schemas.openxmlformats.org/presentationml/2006/main">
+  <p:cSld>
+    <p:spTree>
+      <p:nvGrpSpPr>
+        <p:cNvPr id="1" name=""/>
+        <p:cNvGrpSpPr/>
+        <p:nvPr/>
+      </p:nvGrpSpPr>
+      <p:grpSpPr>
+        <a:xfrm>
+          <a:off x="0" y="0"/>
+          <a:ext cx="0" cy="0"/>
+          <a:chOff x="0" y="0"/>
+          <a:chExt cx="0" cy="0"/>
+        </a:xfrm>
+      </p:grpSpPr>
+      <p:sp>
+        <p:nvSpPr>
+          <p:cNvPr id="2" name="Folienbildplatzhalter 1"/>
+          <p:cNvSpPr>
+            <a:spLocks noGrp="1" noRot="1" noChangeAspect="1"/>
+          </p:cNvSpPr>
+          <p:nvPr>
+            <p:ph type="sldImg"/>
+          </p:nvPr>
+        </p:nvSpPr>
+        <p:spPr/>
+      </p:sp>
+      <p:sp>
+        <p:nvSpPr>
+          <p:cNvPr id="3" name="Notizenplatzhalter 2"/>
+          <p:cNvSpPr>
+            <a:spLocks noGrp="1"/>
+          </p:cNvSpPr>
+          <p:nvPr>
+            <p:ph type="body" idx="1"/>
+          </p:nvPr>
+        </p:nvSpPr>
+        <p:spPr/>
+        <p:txBody>
+          <a:bodyPr/>
+          <a:lstStyle/>
+          <a:p>
+            <a:r>
+              <a:rPr lang="de-DE" dirty="0" smtClean="0"/>
+              <a:t>MARVIN</a:t>
+            </a:r>
+            <a:endParaRPr lang="de-DE" dirty="0"/>
+          </a:p>
+        </p:txBody>
+      </p:sp>
+      <p:sp>
+        <p:nvSpPr>
+          <p:cNvPr id="4" name="Foliennummernplatzhalter 3"/>
+          <p:cNvSpPr>
+            <a:spLocks noGrp="1"/>
+          </p:cNvSpPr>
+          <p:nvPr>
+            <p:ph type="sldNum" sz="quarter" idx="10"/>
+          </p:nvPr>
+        </p:nvSpPr>
+        <p:spPr/>
+        <p:txBody>
+          <a:bodyPr/>
+          <a:lstStyle/>
+          <a:p>
+            <a:fld id="{4C40B096-980F-4B1D-B616-BA01D9772A24}" type="slidenum">
+              <a:rPr lang="de-DE" smtClean="0"/>
+              <a:t>10</a:t>
+            </a:fld>
+            <a:endParaRPr lang="de-DE"/>
+          </a:p>
+        </p:txBody>
+      </p:sp>
+    </p:spTree>
+    <p:extLst>
+      <p:ext uri="{BB962C8B-B14F-4D97-AF65-F5344CB8AC3E}">
+        <p14:creationId xmlns:p14="http://schemas.microsoft.com/office/powerpoint/2010/main" val="3188059666"/>
+      </p:ext>
+    </p:extLst>
+  </p:cSld>
+  <p:clrMapOvr>
+    <a:masterClrMapping/>
+  </p:clrMapOvr>
+</p:notes>
+</file>
+
+<file path=ppt/notesSlides/notesSlide7.xml><?xml version="1.0" encoding="utf-8"?>
+<p:notes xmlns:a="http://schemas.openxmlformats.org/drawingml/2006/main" xmlns:r="http://schemas.openxmlformats.org/officeDocument/2006/relationships" xmlns:p="http://schemas.openxmlformats.org/presentationml/2006/main">
+  <p:cSld>
+    <p:spTree>
+      <p:nvGrpSpPr>
+        <p:cNvPr id="1" name=""/>
+        <p:cNvGrpSpPr/>
+        <p:nvPr/>
+      </p:nvGrpSpPr>
+      <p:grpSpPr>
+        <a:xfrm>
+          <a:off x="0" y="0"/>
+          <a:ext cx="0" cy="0"/>
+          <a:chOff x="0" y="0"/>
+          <a:chExt cx="0" cy="0"/>
+        </a:xfrm>
+      </p:grpSpPr>
+      <p:sp>
+        <p:nvSpPr>
+          <p:cNvPr id="2" name="Folienbildplatzhalter 1"/>
+          <p:cNvSpPr>
+            <a:spLocks noGrp="1" noRot="1" noChangeAspect="1"/>
+          </p:cNvSpPr>
+          <p:nvPr>
+            <p:ph type="sldImg"/>
+          </p:nvPr>
+        </p:nvSpPr>
+        <p:spPr/>
+      </p:sp>
+      <p:sp>
+        <p:nvSpPr>
+          <p:cNvPr id="3" name="Notizenplatzhalter 2"/>
+          <p:cNvSpPr>
+            <a:spLocks noGrp="1"/>
+          </p:cNvSpPr>
+          <p:nvPr>
+            <p:ph type="body" idx="1"/>
+          </p:nvPr>
+        </p:nvSpPr>
+        <p:spPr/>
+        <p:txBody>
+          <a:bodyPr/>
+          <a:lstStyle/>
+          <a:p>
+            <a:r>
+              <a:rPr lang="de-DE" dirty="0" smtClean="0"/>
+              <a:t>MARVIN</a:t>
+            </a:r>
+            <a:endParaRPr lang="de-DE" dirty="0"/>
+          </a:p>
+        </p:txBody>
+      </p:sp>
+      <p:sp>
+        <p:nvSpPr>
+          <p:cNvPr id="4" name="Foliennummernplatzhalter 3"/>
+          <p:cNvSpPr>
+            <a:spLocks noGrp="1"/>
+          </p:cNvSpPr>
+          <p:nvPr>
+            <p:ph type="sldNum" sz="quarter" idx="10"/>
+          </p:nvPr>
+        </p:nvSpPr>
+        <p:spPr/>
+        <p:txBody>
+          <a:bodyPr/>
+          <a:lstStyle/>
+          <a:p>
+            <a:fld id="{4C40B096-980F-4B1D-B616-BA01D9772A24}" type="slidenum">
+              <a:rPr lang="de-DE" smtClean="0"/>
+              <a:t>11</a:t>
+            </a:fld>
+            <a:endParaRPr lang="de-DE"/>
+          </a:p>
+        </p:txBody>
+      </p:sp>
+    </p:spTree>
+    <p:extLst>
+      <p:ext uri="{BB962C8B-B14F-4D97-AF65-F5344CB8AC3E}">
+        <p14:creationId xmlns:p14="http://schemas.microsoft.com/office/powerpoint/2010/main" val="22202235"/>
+      </p:ext>
+    </p:extLst>
+  </p:cSld>
+  <p:clrMapOvr>
+    <a:masterClrMapping/>
+  </p:clrMapOvr>
+</p:notes>
+</file>
+
+<file path=ppt/notesSlides/notesSlide8.xml><?xml version="1.0" encoding="utf-8"?>
+<p:notes xmlns:a="http://schemas.openxmlformats.org/drawingml/2006/main" xmlns:r="http://schemas.openxmlformats.org/officeDocument/2006/relationships" xmlns:p="http://schemas.openxmlformats.org/presentationml/2006/main">
+  <p:cSld>
+    <p:spTree>
+      <p:nvGrpSpPr>
+        <p:cNvPr id="1" name=""/>
+        <p:cNvGrpSpPr/>
+        <p:nvPr/>
+      </p:nvGrpSpPr>
+      <p:grpSpPr>
+        <a:xfrm>
+          <a:off x="0" y="0"/>
+          <a:ext cx="0" cy="0"/>
+          <a:chOff x="0" y="0"/>
+          <a:chExt cx="0" cy="0"/>
+        </a:xfrm>
+      </p:grpSpPr>
+      <p:sp>
+        <p:nvSpPr>
+          <p:cNvPr id="2" name="Folienbildplatzhalter 1"/>
+          <p:cNvSpPr>
+            <a:spLocks noGrp="1" noRot="1" noChangeAspect="1"/>
+          </p:cNvSpPr>
+          <p:nvPr>
+            <p:ph type="sldImg"/>
+          </p:nvPr>
+        </p:nvSpPr>
+        <p:spPr/>
+      </p:sp>
+      <p:sp>
+        <p:nvSpPr>
+          <p:cNvPr id="3" name="Notizenplatzhalter 2"/>
+          <p:cNvSpPr>
+            <a:spLocks noGrp="1"/>
+          </p:cNvSpPr>
+          <p:nvPr>
+            <p:ph type="body" idx="1"/>
+          </p:nvPr>
+        </p:nvSpPr>
+        <p:spPr/>
+        <p:txBody>
+          <a:bodyPr/>
+          <a:lstStyle/>
+          <a:p>
+            <a:r>
+              <a:rPr lang="de-DE" dirty="0" smtClean="0"/>
+              <a:t>MARC</a:t>
+            </a:r>
+            <a:endParaRPr lang="de-DE" dirty="0"/>
+          </a:p>
+        </p:txBody>
+      </p:sp>
+      <p:sp>
+        <p:nvSpPr>
+          <p:cNvPr id="4" name="Foliennummernplatzhalter 3"/>
+          <p:cNvSpPr>
+            <a:spLocks noGrp="1"/>
+          </p:cNvSpPr>
+          <p:nvPr>
+            <p:ph type="sldNum" sz="quarter" idx="10"/>
+          </p:nvPr>
+        </p:nvSpPr>
+        <p:spPr/>
+        <p:txBody>
+          <a:bodyPr/>
+          <a:lstStyle/>
+          <a:p>
+            <a:fld id="{4C40B096-980F-4B1D-B616-BA01D9772A24}" type="slidenum">
+              <a:rPr lang="de-DE" smtClean="0"/>
+              <a:t>12</a:t>
+            </a:fld>
+            <a:endParaRPr lang="de-DE"/>
+          </a:p>
+        </p:txBody>
+      </p:sp>
+    </p:spTree>
+    <p:extLst>
+      <p:ext uri="{BB962C8B-B14F-4D97-AF65-F5344CB8AC3E}">
+        <p14:creationId xmlns:p14="http://schemas.microsoft.com/office/powerpoint/2010/main" val="1007455932"/>
+      </p:ext>
+    </p:extLst>
+  </p:cSld>
+  <p:clrMapOvr>
+    <a:masterClrMapping/>
+  </p:clrMapOvr>
+</p:notes>
+</file>
+
+<file path=ppt/notesSlides/notesSlide9.xml><?xml version="1.0" encoding="utf-8"?>
+<p:notes xmlns:a="http://schemas.openxmlformats.org/drawingml/2006/main" xmlns:r="http://schemas.openxmlformats.org/officeDocument/2006/relationships" xmlns:p="http://schemas.openxmlformats.org/presentationml/2006/main">
+  <p:cSld>
+    <p:spTree>
+      <p:nvGrpSpPr>
+        <p:cNvPr id="1" name=""/>
+        <p:cNvGrpSpPr/>
+        <p:nvPr/>
+      </p:nvGrpSpPr>
+      <p:grpSpPr>
+        <a:xfrm>
+          <a:off x="0" y="0"/>
+          <a:ext cx="0" cy="0"/>
+          <a:chOff x="0" y="0"/>
+          <a:chExt cx="0" cy="0"/>
+        </a:xfrm>
+      </p:grpSpPr>
+      <p:sp>
+        <p:nvSpPr>
+          <p:cNvPr id="2" name="Folienbildplatzhalter 1"/>
+          <p:cNvSpPr>
+            <a:spLocks noGrp="1" noRot="1" noChangeAspect="1"/>
+          </p:cNvSpPr>
+          <p:nvPr>
+            <p:ph type="sldImg"/>
+          </p:nvPr>
+        </p:nvSpPr>
+        <p:spPr/>
+      </p:sp>
+      <p:sp>
+        <p:nvSpPr>
+          <p:cNvPr id="3" name="Notizenplatzhalter 2"/>
+          <p:cNvSpPr>
+            <a:spLocks noGrp="1"/>
+          </p:cNvSpPr>
+          <p:nvPr>
+            <p:ph type="body" idx="1"/>
+          </p:nvPr>
+        </p:nvSpPr>
+        <p:spPr/>
+        <p:txBody>
+          <a:bodyPr/>
+          <a:lstStyle/>
+          <a:p>
+            <a:r>
+              <a:rPr lang="de-DE" dirty="0" smtClean="0"/>
+              <a:t>MANU</a:t>
+            </a:r>
+            <a:endParaRPr lang="de-DE" dirty="0"/>
+          </a:p>
+        </p:txBody>
+      </p:sp>
+      <p:sp>
+        <p:nvSpPr>
+          <p:cNvPr id="4" name="Foliennummernplatzhalter 3"/>
+          <p:cNvSpPr>
+            <a:spLocks noGrp="1"/>
+          </p:cNvSpPr>
+          <p:nvPr>
+            <p:ph type="sldNum" sz="quarter" idx="10"/>
+          </p:nvPr>
+        </p:nvSpPr>
+        <p:spPr/>
+        <p:txBody>
+          <a:bodyPr/>
+          <a:lstStyle/>
+          <a:p>
+            <a:fld id="{4C40B096-980F-4B1D-B616-BA01D9772A24}" type="slidenum">
+              <a:rPr lang="de-DE" smtClean="0"/>
+              <a:t>13</a:t>
+            </a:fld>
+            <a:endParaRPr lang="de-DE"/>
+          </a:p>
+        </p:txBody>
+      </p:sp>
+    </p:spTree>
+    <p:extLst>
+      <p:ext uri="{BB962C8B-B14F-4D97-AF65-F5344CB8AC3E}">
+        <p14:creationId xmlns:p14="http://schemas.microsoft.com/office/powerpoint/2010/main" val="3050164613"/>
+      </p:ext>
+    </p:extLst>
+  </p:cSld>
+  <p:clrMapOvr>
+    <a:masterClrMapping/>
+  </p:clrMapOvr>
+</p:notes>
 </file>
 
 <file path=ppt/slideLayouts/slideLayout1.xml><?xml version="1.0" encoding="utf-8"?>
@@ -4414,7 +5298,7 @@
                   </a:schemeClr>
                 </a:solidFill>
               </a:rPr>
-              <a:t>DEMO</a:t>
+              <a:t>ARCHITEKTUR</a:t>
             </a:r>
             <a:endParaRPr lang="de-DE" dirty="0">
               <a:solidFill>
@@ -4441,7 +5325,14 @@
           <a:bodyPr/>
           <a:lstStyle/>
           <a:p>
-            <a:endParaRPr lang="de-DE"/>
+            <a:pPr marL="0" indent="0">
+              <a:buNone/>
+            </a:pPr>
+            <a:r>
+              <a:rPr lang="de-DE" dirty="0" smtClean="0"/>
+              <a:t>ARCHITEKTUR</a:t>
+            </a:r>
+            <a:endParaRPr lang="de-DE" dirty="0"/>
           </a:p>
         </p:txBody>
       </p:sp>
@@ -4471,7 +5362,7 @@
     </p:spTree>
     <p:extLst>
       <p:ext uri="{BB962C8B-B14F-4D97-AF65-F5344CB8AC3E}">
-        <p14:creationId xmlns:p14="http://schemas.microsoft.com/office/powerpoint/2010/main" val="465211113"/>
+        <p14:creationId xmlns:p14="http://schemas.microsoft.com/office/powerpoint/2010/main" val="58973324"/>
       </p:ext>
     </p:extLst>
   </p:cSld>
@@ -4521,6 +5412,626 @@
           <a:lstStyle/>
           <a:p>
             <a:r>
+              <a:rPr lang="de-DE" dirty="0" smtClean="0">
+                <a:solidFill>
+                  <a:schemeClr val="bg1">
+                    <a:lumMod val="50000"/>
+                  </a:schemeClr>
+                </a:solidFill>
+              </a:rPr>
+              <a:t>ARCHITEKTUR</a:t>
+            </a:r>
+            <a:endParaRPr lang="de-DE" dirty="0">
+              <a:solidFill>
+                <a:schemeClr val="bg1">
+                  <a:lumMod val="50000"/>
+                </a:schemeClr>
+              </a:solidFill>
+            </a:endParaRPr>
+          </a:p>
+        </p:txBody>
+      </p:sp>
+      <p:sp>
+        <p:nvSpPr>
+          <p:cNvPr id="3" name="Inhaltsplatzhalter 2"/>
+          <p:cNvSpPr>
+            <a:spLocks noGrp="1"/>
+          </p:cNvSpPr>
+          <p:nvPr>
+            <p:ph idx="1"/>
+          </p:nvPr>
+        </p:nvSpPr>
+        <p:spPr/>
+        <p:txBody>
+          <a:bodyPr/>
+          <a:lstStyle/>
+          <a:p>
+            <a:r>
+              <a:rPr lang="de-DE" dirty="0" smtClean="0"/>
+              <a:t>QUESTION ALGO DESIGN</a:t>
+            </a:r>
+            <a:endParaRPr lang="de-DE" dirty="0"/>
+          </a:p>
+        </p:txBody>
+      </p:sp>
+      <p:sp>
+        <p:nvSpPr>
+          <p:cNvPr id="5" name="Foliennummernplatzhalter 4"/>
+          <p:cNvSpPr>
+            <a:spLocks noGrp="1"/>
+          </p:cNvSpPr>
+          <p:nvPr>
+            <p:ph type="sldNum" sz="quarter" idx="12"/>
+          </p:nvPr>
+        </p:nvSpPr>
+        <p:spPr/>
+        <p:txBody>
+          <a:bodyPr/>
+          <a:lstStyle/>
+          <a:p>
+            <a:fld id="{BEA2534F-1EDD-48ED-BC5A-02D188FC5C63}" type="slidenum">
+              <a:rPr lang="de-DE" smtClean="0"/>
+              <a:t>11</a:t>
+            </a:fld>
+            <a:endParaRPr lang="de-DE" dirty="0"/>
+          </a:p>
+        </p:txBody>
+      </p:sp>
+    </p:spTree>
+    <p:extLst>
+      <p:ext uri="{BB962C8B-B14F-4D97-AF65-F5344CB8AC3E}">
+        <p14:creationId xmlns:p14="http://schemas.microsoft.com/office/powerpoint/2010/main" val="2999327494"/>
+      </p:ext>
+    </p:extLst>
+  </p:cSld>
+  <p:clrMapOvr>
+    <a:masterClrMapping/>
+  </p:clrMapOvr>
+  <p:timing>
+    <p:tnLst>
+      <p:par>
+        <p:cTn id="1" dur="indefinite" restart="never" nodeType="tmRoot"/>
+      </p:par>
+    </p:tnLst>
+  </p:timing>
+</p:sld>
+</file>
+
+<file path=ppt/slides/slide12.xml><?xml version="1.0" encoding="utf-8"?>
+<p:sld xmlns:a="http://schemas.openxmlformats.org/drawingml/2006/main" xmlns:r="http://schemas.openxmlformats.org/officeDocument/2006/relationships" xmlns:p="http://schemas.openxmlformats.org/presentationml/2006/main">
+  <p:cSld>
+    <p:spTree>
+      <p:nvGrpSpPr>
+        <p:cNvPr id="1" name=""/>
+        <p:cNvGrpSpPr/>
+        <p:nvPr/>
+      </p:nvGrpSpPr>
+      <p:grpSpPr>
+        <a:xfrm>
+          <a:off x="0" y="0"/>
+          <a:ext cx="0" cy="0"/>
+          <a:chOff x="0" y="0"/>
+          <a:chExt cx="0" cy="0"/>
+        </a:xfrm>
+      </p:grpSpPr>
+      <p:sp>
+        <p:nvSpPr>
+          <p:cNvPr id="2" name="Titel 1"/>
+          <p:cNvSpPr>
+            <a:spLocks noGrp="1"/>
+          </p:cNvSpPr>
+          <p:nvPr>
+            <p:ph type="title"/>
+          </p:nvPr>
+        </p:nvSpPr>
+        <p:spPr/>
+        <p:txBody>
+          <a:bodyPr/>
+          <a:lstStyle/>
+          <a:p>
+            <a:r>
+              <a:rPr lang="de-DE" dirty="0" smtClean="0">
+                <a:solidFill>
+                  <a:schemeClr val="bg1">
+                    <a:lumMod val="50000"/>
+                  </a:schemeClr>
+                </a:solidFill>
+              </a:rPr>
+              <a:t>CLASS DIAGRAM</a:t>
+            </a:r>
+            <a:endParaRPr lang="de-DE" dirty="0">
+              <a:solidFill>
+                <a:schemeClr val="bg1">
+                  <a:lumMod val="50000"/>
+                </a:schemeClr>
+              </a:solidFill>
+            </a:endParaRPr>
+          </a:p>
+        </p:txBody>
+      </p:sp>
+      <p:sp>
+        <p:nvSpPr>
+          <p:cNvPr id="3" name="Inhaltsplatzhalter 2"/>
+          <p:cNvSpPr>
+            <a:spLocks noGrp="1"/>
+          </p:cNvSpPr>
+          <p:nvPr>
+            <p:ph idx="1"/>
+          </p:nvPr>
+        </p:nvSpPr>
+        <p:spPr/>
+        <p:txBody>
+          <a:bodyPr/>
+          <a:lstStyle/>
+          <a:p>
+            <a:r>
+              <a:rPr lang="de-DE" dirty="0">
+                <a:hlinkClick r:id="rId3"/>
+              </a:rPr>
+              <a:t>https://</a:t>
+            </a:r>
+            <a:r>
+              <a:rPr lang="de-DE" dirty="0" smtClean="0">
+                <a:hlinkClick r:id="rId3"/>
+              </a:rPr>
+              <a:t>github.com/nappydevelopment/docs/blob/master/svg/New%20Classdiagram.svg</a:t>
+            </a:r>
+            <a:endParaRPr lang="de-DE" dirty="0" smtClean="0"/>
+          </a:p>
+        </p:txBody>
+      </p:sp>
+      <p:sp>
+        <p:nvSpPr>
+          <p:cNvPr id="5" name="Foliennummernplatzhalter 4"/>
+          <p:cNvSpPr>
+            <a:spLocks noGrp="1"/>
+          </p:cNvSpPr>
+          <p:nvPr>
+            <p:ph type="sldNum" sz="quarter" idx="12"/>
+          </p:nvPr>
+        </p:nvSpPr>
+        <p:spPr/>
+        <p:txBody>
+          <a:bodyPr/>
+          <a:lstStyle/>
+          <a:p>
+            <a:fld id="{BEA2534F-1EDD-48ED-BC5A-02D188FC5C63}" type="slidenum">
+              <a:rPr lang="de-DE" smtClean="0"/>
+              <a:t>12</a:t>
+            </a:fld>
+            <a:endParaRPr lang="de-DE" dirty="0"/>
+          </a:p>
+        </p:txBody>
+      </p:sp>
+    </p:spTree>
+    <p:extLst>
+      <p:ext uri="{BB962C8B-B14F-4D97-AF65-F5344CB8AC3E}">
+        <p14:creationId xmlns:p14="http://schemas.microsoft.com/office/powerpoint/2010/main" val="3717575877"/>
+      </p:ext>
+    </p:extLst>
+  </p:cSld>
+  <p:clrMapOvr>
+    <a:masterClrMapping/>
+  </p:clrMapOvr>
+  <p:timing>
+    <p:tnLst>
+      <p:par>
+        <p:cTn id="1" dur="indefinite" restart="never" nodeType="tmRoot"/>
+      </p:par>
+    </p:tnLst>
+  </p:timing>
+</p:sld>
+</file>
+
+<file path=ppt/slides/slide13.xml><?xml version="1.0" encoding="utf-8"?>
+<p:sld xmlns:a="http://schemas.openxmlformats.org/drawingml/2006/main" xmlns:r="http://schemas.openxmlformats.org/officeDocument/2006/relationships" xmlns:p="http://schemas.openxmlformats.org/presentationml/2006/main">
+  <p:cSld>
+    <p:spTree>
+      <p:nvGrpSpPr>
+        <p:cNvPr id="1" name=""/>
+        <p:cNvGrpSpPr/>
+        <p:nvPr/>
+      </p:nvGrpSpPr>
+      <p:grpSpPr>
+        <a:xfrm>
+          <a:off x="0" y="0"/>
+          <a:ext cx="0" cy="0"/>
+          <a:chOff x="0" y="0"/>
+          <a:chExt cx="0" cy="0"/>
+        </a:xfrm>
+      </p:grpSpPr>
+      <p:sp>
+        <p:nvSpPr>
+          <p:cNvPr id="2" name="Titel 1"/>
+          <p:cNvSpPr>
+            <a:spLocks noGrp="1"/>
+          </p:cNvSpPr>
+          <p:nvPr>
+            <p:ph type="title"/>
+          </p:nvPr>
+        </p:nvSpPr>
+        <p:spPr/>
+        <p:txBody>
+          <a:bodyPr/>
+          <a:lstStyle/>
+          <a:p>
+            <a:r>
+              <a:rPr lang="de-DE" dirty="0" smtClean="0">
+                <a:solidFill>
+                  <a:schemeClr val="bg1">
+                    <a:lumMod val="50000"/>
+                  </a:schemeClr>
+                </a:solidFill>
+              </a:rPr>
+              <a:t>DEMO – ENJOY </a:t>
+            </a:r>
+            <a:r>
+              <a:rPr lang="de-DE" dirty="0" smtClean="0">
+                <a:solidFill>
+                  <a:schemeClr val="bg1">
+                    <a:lumMod val="50000"/>
+                  </a:schemeClr>
+                </a:solidFill>
+                <a:sym typeface="Wingdings" panose="05000000000000000000" pitchFamily="2" charset="2"/>
+              </a:rPr>
+              <a:t></a:t>
+            </a:r>
+            <a:endParaRPr lang="de-DE" dirty="0">
+              <a:solidFill>
+                <a:schemeClr val="bg1">
+                  <a:lumMod val="50000"/>
+                </a:schemeClr>
+              </a:solidFill>
+            </a:endParaRPr>
+          </a:p>
+        </p:txBody>
+      </p:sp>
+      <p:sp>
+        <p:nvSpPr>
+          <p:cNvPr id="3" name="Inhaltsplatzhalter 2"/>
+          <p:cNvSpPr>
+            <a:spLocks noGrp="1"/>
+          </p:cNvSpPr>
+          <p:nvPr>
+            <p:ph idx="1"/>
+          </p:nvPr>
+        </p:nvSpPr>
+        <p:spPr/>
+        <p:txBody>
+          <a:bodyPr/>
+          <a:lstStyle/>
+          <a:p>
+            <a:r>
+              <a:rPr lang="de-DE" dirty="0" err="1" smtClean="0"/>
+              <a:t>Jar</a:t>
+            </a:r>
+            <a:r>
+              <a:rPr lang="de-DE" dirty="0"/>
+              <a:t>: </a:t>
+            </a:r>
+            <a:r>
+              <a:rPr lang="de-DE" dirty="0">
+                <a:hlinkClick r:id="rId3"/>
+              </a:rPr>
+              <a:t>https://</a:t>
+            </a:r>
+            <a:r>
+              <a:rPr lang="de-DE" dirty="0" smtClean="0">
+                <a:hlinkClick r:id="rId3"/>
+              </a:rPr>
+              <a:t>github.com/nappydevelopment/Nappy-the-ingenious/blob/master/jar/Nappy-the-ingenious.jar</a:t>
+            </a:r>
+            <a:r>
+              <a:rPr lang="de-DE" dirty="0" smtClean="0"/>
+              <a:t> </a:t>
+            </a:r>
+            <a:endParaRPr lang="de-DE" dirty="0"/>
+          </a:p>
+        </p:txBody>
+      </p:sp>
+      <p:sp>
+        <p:nvSpPr>
+          <p:cNvPr id="5" name="Foliennummernplatzhalter 4"/>
+          <p:cNvSpPr>
+            <a:spLocks noGrp="1"/>
+          </p:cNvSpPr>
+          <p:nvPr>
+            <p:ph type="sldNum" sz="quarter" idx="12"/>
+          </p:nvPr>
+        </p:nvSpPr>
+        <p:spPr/>
+        <p:txBody>
+          <a:bodyPr/>
+          <a:lstStyle/>
+          <a:p>
+            <a:fld id="{BEA2534F-1EDD-48ED-BC5A-02D188FC5C63}" type="slidenum">
+              <a:rPr lang="de-DE" smtClean="0"/>
+              <a:t>13</a:t>
+            </a:fld>
+            <a:endParaRPr lang="de-DE" dirty="0"/>
+          </a:p>
+        </p:txBody>
+      </p:sp>
+    </p:spTree>
+    <p:extLst>
+      <p:ext uri="{BB962C8B-B14F-4D97-AF65-F5344CB8AC3E}">
+        <p14:creationId xmlns:p14="http://schemas.microsoft.com/office/powerpoint/2010/main" val="465211113"/>
+      </p:ext>
+    </p:extLst>
+  </p:cSld>
+  <p:clrMapOvr>
+    <a:masterClrMapping/>
+  </p:clrMapOvr>
+  <p:timing>
+    <p:tnLst>
+      <p:par>
+        <p:cTn id="1" dur="indefinite" restart="never" nodeType="tmRoot"/>
+      </p:par>
+    </p:tnLst>
+  </p:timing>
+</p:sld>
+</file>
+
+<file path=ppt/slides/slide14.xml><?xml version="1.0" encoding="utf-8"?>
+<p:sld xmlns:a="http://schemas.openxmlformats.org/drawingml/2006/main" xmlns:r="http://schemas.openxmlformats.org/officeDocument/2006/relationships" xmlns:p="http://schemas.openxmlformats.org/presentationml/2006/main">
+  <p:cSld>
+    <p:spTree>
+      <p:nvGrpSpPr>
+        <p:cNvPr id="1" name=""/>
+        <p:cNvGrpSpPr/>
+        <p:nvPr/>
+      </p:nvGrpSpPr>
+      <p:grpSpPr>
+        <a:xfrm>
+          <a:off x="0" y="0"/>
+          <a:ext cx="0" cy="0"/>
+          <a:chOff x="0" y="0"/>
+          <a:chExt cx="0" cy="0"/>
+        </a:xfrm>
+      </p:grpSpPr>
+      <p:sp>
+        <p:nvSpPr>
+          <p:cNvPr id="2" name="Titel 1"/>
+          <p:cNvSpPr>
+            <a:spLocks noGrp="1"/>
+          </p:cNvSpPr>
+          <p:nvPr>
+            <p:ph type="title"/>
+          </p:nvPr>
+        </p:nvSpPr>
+        <p:spPr/>
+        <p:txBody>
+          <a:bodyPr/>
+          <a:lstStyle/>
+          <a:p>
+            <a:r>
+              <a:rPr lang="de-DE" dirty="0" smtClean="0">
+                <a:solidFill>
+                  <a:schemeClr val="bg1">
+                    <a:lumMod val="50000"/>
+                  </a:schemeClr>
+                </a:solidFill>
+              </a:rPr>
+              <a:t>AUSBLICK</a:t>
+            </a:r>
+            <a:endParaRPr lang="de-DE" dirty="0">
+              <a:solidFill>
+                <a:schemeClr val="bg1">
+                  <a:lumMod val="50000"/>
+                </a:schemeClr>
+              </a:solidFill>
+            </a:endParaRPr>
+          </a:p>
+        </p:txBody>
+      </p:sp>
+      <p:sp>
+        <p:nvSpPr>
+          <p:cNvPr id="3" name="Inhaltsplatzhalter 2"/>
+          <p:cNvSpPr>
+            <a:spLocks noGrp="1"/>
+          </p:cNvSpPr>
+          <p:nvPr>
+            <p:ph idx="1"/>
+          </p:nvPr>
+        </p:nvSpPr>
+        <p:spPr/>
+        <p:txBody>
+          <a:bodyPr/>
+          <a:lstStyle/>
+          <a:p>
+            <a:pPr>
+              <a:buFont typeface="Courier New" panose="02070309020205020404" pitchFamily="49" charset="0"/>
+              <a:buChar char="o"/>
+            </a:pPr>
+            <a:r>
+              <a:rPr lang="de-DE" dirty="0"/>
+              <a:t> </a:t>
+            </a:r>
+            <a:r>
+              <a:rPr lang="de-DE" dirty="0" smtClean="0"/>
+              <a:t>Spielmodus 2</a:t>
+            </a:r>
+          </a:p>
+          <a:p>
+            <a:pPr>
+              <a:buFont typeface="Courier New" panose="02070309020205020404" pitchFamily="49" charset="0"/>
+              <a:buChar char="o"/>
+            </a:pPr>
+            <a:r>
+              <a:rPr lang="de-DE" dirty="0"/>
+              <a:t> </a:t>
+            </a:r>
+            <a:r>
+              <a:rPr lang="de-DE" dirty="0" smtClean="0"/>
+              <a:t>Statistik </a:t>
+            </a:r>
+          </a:p>
+          <a:p>
+            <a:pPr lvl="1">
+              <a:buFont typeface="Courier New" panose="02070309020205020404" pitchFamily="49" charset="0"/>
+              <a:buChar char="o"/>
+            </a:pPr>
+            <a:r>
+              <a:rPr lang="de-DE" dirty="0" smtClean="0"/>
+              <a:t>Meist gespielte Charaktere</a:t>
+            </a:r>
+          </a:p>
+          <a:p>
+            <a:pPr lvl="1">
+              <a:buFont typeface="Courier New" panose="02070309020205020404" pitchFamily="49" charset="0"/>
+              <a:buChar char="o"/>
+            </a:pPr>
+            <a:r>
+              <a:rPr lang="de-DE" dirty="0" smtClean="0"/>
+              <a:t>Beste Runden gegen </a:t>
+            </a:r>
+            <a:r>
+              <a:rPr lang="de-DE" dirty="0" err="1" smtClean="0"/>
+              <a:t>Nappy</a:t>
+            </a:r>
+            <a:endParaRPr lang="de-DE" dirty="0" smtClean="0"/>
+          </a:p>
+          <a:p>
+            <a:pPr>
+              <a:buFont typeface="Courier New" panose="02070309020205020404" pitchFamily="49" charset="0"/>
+              <a:buChar char="o"/>
+            </a:pPr>
+            <a:r>
+              <a:rPr lang="de-DE" dirty="0" smtClean="0"/>
+              <a:t> Einstellungen (Farbschema und Spielmodus)</a:t>
+            </a:r>
+          </a:p>
+          <a:p>
+            <a:pPr>
+              <a:buFont typeface="Courier New" panose="02070309020205020404" pitchFamily="49" charset="0"/>
+              <a:buChar char="o"/>
+            </a:pPr>
+            <a:r>
+              <a:rPr lang="de-DE" dirty="0" smtClean="0"/>
+              <a:t> Soundeffekte + ggf. Ladebildschirm</a:t>
+            </a:r>
+          </a:p>
+          <a:p>
+            <a:pPr>
+              <a:buFont typeface="Courier New" panose="02070309020205020404" pitchFamily="49" charset="0"/>
+              <a:buChar char="o"/>
+            </a:pPr>
+            <a:r>
+              <a:rPr lang="de-DE" dirty="0"/>
+              <a:t> </a:t>
+            </a:r>
+            <a:r>
+              <a:rPr lang="de-DE" dirty="0" smtClean="0"/>
+              <a:t>Charakter hinzufügen</a:t>
+            </a:r>
+          </a:p>
+          <a:p>
+            <a:pPr>
+              <a:buFont typeface="Courier New" panose="02070309020205020404" pitchFamily="49" charset="0"/>
+              <a:buChar char="o"/>
+            </a:pPr>
+            <a:r>
+              <a:rPr lang="de-DE" dirty="0"/>
+              <a:t> </a:t>
+            </a:r>
+            <a:r>
+              <a:rPr lang="de-DE" dirty="0" smtClean="0"/>
+              <a:t>Optimierungen (Fragen, Algorithmus, …)</a:t>
+            </a:r>
+          </a:p>
+          <a:p>
+            <a:pPr>
+              <a:buFont typeface="Courier New" panose="02070309020205020404" pitchFamily="49" charset="0"/>
+              <a:buChar char="o"/>
+            </a:pPr>
+            <a:r>
+              <a:rPr lang="de-DE" dirty="0"/>
+              <a:t> </a:t>
+            </a:r>
+            <a:r>
+              <a:rPr lang="de-DE" dirty="0" smtClean="0"/>
+              <a:t>Stress-Test, Start-Test, Funktionaltests, …</a:t>
+            </a:r>
+            <a:endParaRPr lang="de-DE" dirty="0"/>
+          </a:p>
+        </p:txBody>
+      </p:sp>
+      <p:sp>
+        <p:nvSpPr>
+          <p:cNvPr id="5" name="Foliennummernplatzhalter 4"/>
+          <p:cNvSpPr>
+            <a:spLocks noGrp="1"/>
+          </p:cNvSpPr>
+          <p:nvPr>
+            <p:ph type="sldNum" sz="quarter" idx="12"/>
+          </p:nvPr>
+        </p:nvSpPr>
+        <p:spPr/>
+        <p:txBody>
+          <a:bodyPr/>
+          <a:lstStyle/>
+          <a:p>
+            <a:fld id="{BEA2534F-1EDD-48ED-BC5A-02D188FC5C63}" type="slidenum">
+              <a:rPr lang="de-DE" smtClean="0"/>
+              <a:t>14</a:t>
+            </a:fld>
+            <a:endParaRPr lang="de-DE" dirty="0"/>
+          </a:p>
+        </p:txBody>
+      </p:sp>
+    </p:spTree>
+    <p:extLst>
+      <p:ext uri="{BB962C8B-B14F-4D97-AF65-F5344CB8AC3E}">
+        <p14:creationId xmlns:p14="http://schemas.microsoft.com/office/powerpoint/2010/main" val="1843818158"/>
+      </p:ext>
+    </p:extLst>
+  </p:cSld>
+  <p:clrMapOvr>
+    <a:masterClrMapping/>
+  </p:clrMapOvr>
+  <p:timing>
+    <p:tnLst>
+      <p:par>
+        <p:cTn id="1" dur="indefinite" restart="never" nodeType="tmRoot"/>
+      </p:par>
+    </p:tnLst>
+  </p:timing>
+</p:sld>
+</file>
+
+<file path=ppt/slides/slide15.xml><?xml version="1.0" encoding="utf-8"?>
+<p:sld xmlns:a="http://schemas.openxmlformats.org/drawingml/2006/main" xmlns:r="http://schemas.openxmlformats.org/officeDocument/2006/relationships" xmlns:p="http://schemas.openxmlformats.org/presentationml/2006/main">
+  <p:cSld>
+    <p:spTree>
+      <p:nvGrpSpPr>
+        <p:cNvPr id="1" name=""/>
+        <p:cNvGrpSpPr/>
+        <p:nvPr/>
+      </p:nvGrpSpPr>
+      <p:grpSpPr>
+        <a:xfrm>
+          <a:off x="0" y="0"/>
+          <a:ext cx="0" cy="0"/>
+          <a:chOff x="0" y="0"/>
+          <a:chExt cx="0" cy="0"/>
+        </a:xfrm>
+      </p:grpSpPr>
+      <p:sp>
+        <p:nvSpPr>
+          <p:cNvPr id="2" name="Titel 1"/>
+          <p:cNvSpPr>
+            <a:spLocks noGrp="1"/>
+          </p:cNvSpPr>
+          <p:nvPr>
+            <p:ph type="title"/>
+          </p:nvPr>
+        </p:nvSpPr>
+        <p:spPr/>
+        <p:txBody>
+          <a:bodyPr/>
+          <a:lstStyle/>
+          <a:p>
+            <a:r>
               <a:rPr lang="de-DE" smtClean="0">
                 <a:solidFill>
                   <a:schemeClr val="bg1">
@@ -4555,7 +6066,87 @@
           <a:bodyPr/>
           <a:lstStyle/>
           <a:p>
-            <a:endParaRPr lang="de-DE"/>
+            <a:r>
+              <a:rPr lang="de-DE" dirty="0" err="1" smtClean="0"/>
+              <a:t>GitHub</a:t>
+            </a:r>
+            <a:r>
+              <a:rPr lang="de-DE" dirty="0"/>
+              <a:t> – Code: </a:t>
+            </a:r>
+            <a:r>
+              <a:rPr lang="de-DE" dirty="0">
+                <a:hlinkClick r:id="rId2"/>
+              </a:rPr>
+              <a:t>https://</a:t>
+            </a:r>
+            <a:r>
+              <a:rPr lang="de-DE" dirty="0" smtClean="0">
+                <a:hlinkClick r:id="rId2"/>
+              </a:rPr>
+              <a:t>github.com/nappydevelopment/Nappy-the-ingenious</a:t>
+            </a:r>
+            <a:r>
+              <a:rPr lang="de-DE" dirty="0" smtClean="0"/>
+              <a:t> </a:t>
+            </a:r>
+          </a:p>
+          <a:p>
+            <a:r>
+              <a:rPr lang="de-DE" dirty="0" err="1" smtClean="0"/>
+              <a:t>GitHub</a:t>
+            </a:r>
+            <a:r>
+              <a:rPr lang="de-DE" dirty="0"/>
+              <a:t> – Doku: </a:t>
+            </a:r>
+            <a:r>
+              <a:rPr lang="de-DE" dirty="0">
+                <a:hlinkClick r:id="rId3"/>
+              </a:rPr>
+              <a:t>https://</a:t>
+            </a:r>
+            <a:r>
+              <a:rPr lang="de-DE" dirty="0" smtClean="0">
+                <a:hlinkClick r:id="rId3"/>
+              </a:rPr>
+              <a:t>github.com/nappydevelopment/docs</a:t>
+            </a:r>
+            <a:endParaRPr lang="de-DE" dirty="0" smtClean="0"/>
+          </a:p>
+          <a:p>
+            <a:r>
+              <a:rPr lang="de-DE" dirty="0"/>
+              <a:t>Blog: </a:t>
+            </a:r>
+            <a:r>
+              <a:rPr lang="de-DE" dirty="0">
+                <a:hlinkClick r:id="rId4"/>
+              </a:rPr>
+              <a:t>https://nappydevelopment.wordpress.com</a:t>
+            </a:r>
+            <a:r>
+              <a:rPr lang="de-DE" dirty="0" smtClean="0">
+                <a:hlinkClick r:id="rId4"/>
+              </a:rPr>
+              <a:t>/</a:t>
+            </a:r>
+            <a:r>
+              <a:rPr lang="de-DE" dirty="0" smtClean="0"/>
+              <a:t> </a:t>
+            </a:r>
+          </a:p>
+          <a:p>
+            <a:pPr marL="0" indent="0">
+              <a:buNone/>
+            </a:pPr>
+            <a:r>
+              <a:rPr lang="de-DE" dirty="0" smtClean="0"/>
+              <a:t> </a:t>
+            </a:r>
+          </a:p>
+          <a:p>
+            <a:endParaRPr lang="de-DE" dirty="0"/>
           </a:p>
         </p:txBody>
       </p:sp>
@@ -4576,7 +6167,7 @@
           <a:p>
             <a:fld id="{BEA2534F-1EDD-48ED-BC5A-02D188FC5C63}" type="slidenum">
               <a:rPr lang="de-DE" smtClean="0"/>
-              <a:t>11</a:t>
+              <a:t>15</a:t>
             </a:fld>
             <a:endParaRPr lang="de-DE" dirty="0"/>
           </a:p>
@@ -4666,7 +6257,9 @@
         </p:nvSpPr>
         <p:spPr/>
         <p:txBody>
-          <a:bodyPr/>
+          <a:bodyPr>
+            <a:normAutofit lnSpcReduction="10000"/>
+          </a:bodyPr>
           <a:lstStyle/>
           <a:p>
             <a:pPr marL="457200" indent="-457200">
@@ -4687,6 +6280,59 @@
               <a:rPr lang="de-DE" dirty="0" err="1" smtClean="0"/>
               <a:t>UseCase</a:t>
             </a:r>
+            <a:r>
+              <a:rPr lang="de-DE" dirty="0" smtClean="0"/>
+              <a:t> </a:t>
+            </a:r>
+            <a:r>
+              <a:rPr lang="de-DE" dirty="0" err="1" smtClean="0"/>
+              <a:t>diagram</a:t>
+            </a:r>
+            <a:r>
+              <a:rPr lang="de-DE" dirty="0" smtClean="0"/>
+              <a:t> &amp; </a:t>
+            </a:r>
+            <a:r>
+              <a:rPr lang="de-DE" dirty="0" err="1" smtClean="0"/>
+              <a:t>UseCase‘s</a:t>
+            </a:r>
+            <a:endParaRPr lang="de-DE" dirty="0" smtClean="0"/>
+          </a:p>
+          <a:p>
+            <a:pPr marL="749808" lvl="1" indent="-457200">
+              <a:buFont typeface="+mj-lt"/>
+              <a:buAutoNum type="arabicPeriod"/>
+            </a:pPr>
+            <a:r>
+              <a:rPr lang="de-DE" dirty="0" err="1" smtClean="0"/>
+              <a:t>UceCase</a:t>
+            </a:r>
+            <a:r>
+              <a:rPr lang="de-DE" dirty="0" smtClean="0"/>
+              <a:t> </a:t>
+            </a:r>
+            <a:r>
+              <a:rPr lang="de-DE" dirty="0" err="1" smtClean="0"/>
+              <a:t>Gamemode</a:t>
+            </a:r>
+            <a:r>
+              <a:rPr lang="de-DE" dirty="0" smtClean="0"/>
+              <a:t> 1</a:t>
+            </a:r>
+          </a:p>
+          <a:p>
+            <a:pPr marL="749808" lvl="1" indent="-457200">
+              <a:buFont typeface="+mj-lt"/>
+              <a:buAutoNum type="arabicPeriod"/>
+            </a:pPr>
+            <a:r>
+              <a:rPr lang="de-DE" dirty="0" err="1" smtClean="0"/>
+              <a:t>SikuliX</a:t>
+            </a:r>
+            <a:r>
+              <a:rPr lang="de-DE" dirty="0" smtClean="0"/>
+              <a:t> Demo</a:t>
+            </a:r>
             <a:endParaRPr lang="de-DE" dirty="0" smtClean="0"/>
           </a:p>
           <a:p>
@@ -4722,8 +6368,8 @@
               <a:t>Project </a:t>
             </a:r>
             <a:r>
-              <a:rPr lang="de-DE" dirty="0" err="1" smtClean="0"/>
-              <a:t>Methodology</a:t>
+              <a:rPr lang="de-DE" dirty="0" smtClean="0"/>
+              <a:t>Methodik</a:t>
             </a:r>
             <a:endParaRPr lang="de-DE" dirty="0" smtClean="0"/>
           </a:p>
@@ -4744,7 +6390,11 @@
             </a:pPr>
             <a:r>
               <a:rPr lang="de-DE" dirty="0" smtClean="0"/>
-              <a:t>Live Demo</a:t>
+              <a:t>Live </a:t>
+            </a:r>
+            <a:r>
+              <a:rPr lang="de-DE" dirty="0" smtClean="0"/>
+              <a:t>Demo</a:t>
             </a:r>
           </a:p>
           <a:p>
@@ -4754,8 +6404,20 @@
             </a:pPr>
             <a:r>
               <a:rPr lang="de-DE" dirty="0" smtClean="0"/>
+              <a:t>Ausblick</a:t>
+            </a:r>
+            <a:endParaRPr lang="de-DE" dirty="0" smtClean="0"/>
+          </a:p>
+          <a:p>
+            <a:pPr marL="457200" indent="-457200">
+              <a:buFont typeface="+mj-lt"/>
+              <a:buAutoNum type="arabicPeriod"/>
+            </a:pPr>
+            <a:r>
+              <a:rPr lang="de-DE" dirty="0" smtClean="0"/>
               <a:t>Links</a:t>
             </a:r>
+            <a:endParaRPr lang="de-DE" dirty="0" smtClean="0"/>
           </a:p>
         </p:txBody>
       </p:sp>
@@ -5398,7 +7060,7 @@
           <p:nvPr/>
         </p:nvPicPr>
         <p:blipFill rotWithShape="1">
-          <a:blip r:embed="rId2" cstate="print">
+          <a:blip r:embed="rId3" cstate="print">
             <a:extLst>
               <a:ext uri="{28A0092B-C50C-407E-A947-70E740481C1C}">
                 <a14:useLocalDpi xmlns:a14="http://schemas.microsoft.com/office/drawing/2010/main" val="0"/>
@@ -5560,7 +7222,7 @@
           <p:nvPr/>
         </p:nvPicPr>
         <p:blipFill>
-          <a:blip r:embed="rId2">
+          <a:blip r:embed="rId3">
             <a:extLst>
               <a:ext uri="{28A0092B-C50C-407E-A947-70E740481C1C}">
                 <a14:useLocalDpi xmlns:a14="http://schemas.microsoft.com/office/drawing/2010/main" val="0"/>
@@ -5603,7 +7265,7 @@
           </p:nvPr>
         </p:nvPicPr>
         <p:blipFill>
-          <a:blip r:embed="rId3">
+          <a:blip r:embed="rId4">
             <a:extLst>
               <a:ext uri="{28A0092B-C50C-407E-A947-70E740481C1C}">
                 <a14:useLocalDpi xmlns:a14="http://schemas.microsoft.com/office/drawing/2010/main" val="0"/>
@@ -5644,7 +7306,7 @@
           <p:nvPr/>
         </p:nvPicPr>
         <p:blipFill>
-          <a:blip r:embed="rId4">
+          <a:blip r:embed="rId5">
             <a:extLst>
               <a:ext uri="{28A0092B-C50C-407E-A947-70E740481C1C}">
                 <a14:useLocalDpi xmlns:a14="http://schemas.microsoft.com/office/drawing/2010/main" val="0"/>
@@ -5676,6 +7338,48 @@
           </a:extLst>
         </p:spPr>
       </p:pic>
+      <p:sp>
+        <p:nvSpPr>
+          <p:cNvPr id="4" name="Textfeld 3"/>
+          <p:cNvSpPr txBox="1"/>
+          <p:nvPr/>
+        </p:nvSpPr>
+        <p:spPr>
+          <a:xfrm>
+            <a:off x="8166100" y="5671234"/>
+            <a:ext cx="223138" cy="646331"/>
+          </a:xfrm>
+          <a:prstGeom prst="rect">
+            <a:avLst/>
+          </a:prstGeom>
+          <a:noFill/>
+        </p:spPr>
+        <p:txBody>
+          <a:bodyPr wrap="none" rtlCol="0">
+            <a:spAutoFit/>
+          </a:bodyPr>
+          <a:lstStyle/>
+          <a:p>
+            <a:r>
+              <a:rPr lang="de-DE" sz="1200" dirty="0" smtClean="0"/>
+              <a:t>.</a:t>
+            </a:r>
+          </a:p>
+          <a:p>
+            <a:r>
+              <a:rPr lang="de-DE" sz="1200" dirty="0" smtClean="0"/>
+              <a:t>.</a:t>
+            </a:r>
+          </a:p>
+          <a:p>
+            <a:r>
+              <a:rPr lang="de-DE" sz="1200" dirty="0"/>
+              <a:t>.</a:t>
+            </a:r>
+            <a:endParaRPr lang="de-DE" sz="1200" dirty="0" smtClean="0"/>
+          </a:p>
+        </p:txBody>
+      </p:sp>
     </p:spTree>
     <p:extLst>
       <p:ext uri="{BB962C8B-B14F-4D97-AF65-F5344CB8AC3E}">
@@ -5736,7 +7440,18 @@
                   </a:schemeClr>
                 </a:solidFill>
               </a:rPr>
-              <a:t>SRS</a:t>
+              <a:t>SIKULIX DEMO – ENJOY </a:t>
+            </a:r>
+            <a:r>
+              <a:rPr lang="de-DE" dirty="0" smtClean="0">
+                <a:solidFill>
+                  <a:schemeClr val="bg1">
+                    <a:lumMod val="50000"/>
+                  </a:schemeClr>
+                </a:solidFill>
+                <a:sym typeface="Wingdings" panose="05000000000000000000" pitchFamily="2" charset="2"/>
+              </a:rPr>
+              <a:t></a:t>
             </a:r>
             <a:endParaRPr lang="de-DE" dirty="0">
               <a:solidFill>
@@ -5763,7 +7478,73 @@
           <a:bodyPr/>
           <a:lstStyle/>
           <a:p>
-            <a:endParaRPr lang="de-DE"/>
+            <a:r>
+              <a:rPr lang="de-DE" dirty="0" err="1" smtClean="0"/>
+              <a:t>GitHub</a:t>
+            </a:r>
+            <a:r>
+              <a:rPr lang="de-DE" dirty="0"/>
+              <a:t> </a:t>
+            </a:r>
+            <a:r>
+              <a:rPr lang="de-DE" dirty="0" err="1" smtClean="0"/>
+              <a:t>TestDirectory</a:t>
+            </a:r>
+            <a:r>
+              <a:rPr lang="de-DE" dirty="0" smtClean="0"/>
+              <a:t>: </a:t>
+            </a:r>
+            <a:r>
+              <a:rPr lang="de-DE" dirty="0">
+                <a:hlinkClick r:id="rId3"/>
+              </a:rPr>
+              <a:t>https://</a:t>
+            </a:r>
+            <a:r>
+              <a:rPr lang="de-DE" dirty="0" smtClean="0">
+                <a:hlinkClick r:id="rId3"/>
+              </a:rPr>
+              <a:t>github.com/nappydevelopment/docs/tree/master/sikulix</a:t>
+            </a:r>
+            <a:r>
+              <a:rPr lang="de-DE" dirty="0" smtClean="0"/>
+              <a:t> </a:t>
+            </a:r>
+            <a:br>
+              <a:rPr lang="de-DE" dirty="0" smtClean="0"/>
+            </a:br>
+            <a:r>
+              <a:rPr lang="de-DE" dirty="0" smtClean="0"/>
+              <a:t/>
+            </a:r>
+            <a:br>
+              <a:rPr lang="de-DE" dirty="0" smtClean="0"/>
+            </a:br>
+            <a:r>
+              <a:rPr lang="de-DE" dirty="0" err="1" smtClean="0"/>
+              <a:t>SikuliX</a:t>
+            </a:r>
+            <a:r>
+              <a:rPr lang="de-DE" dirty="0"/>
+              <a:t>: </a:t>
+            </a:r>
+            <a:r>
+              <a:rPr lang="de-DE" dirty="0">
+                <a:hlinkClick r:id="rId4"/>
+              </a:rPr>
+              <a:t>http://www.sikulix.com</a:t>
+            </a:r>
+            <a:r>
+              <a:rPr lang="de-DE" dirty="0" smtClean="0">
+                <a:hlinkClick r:id="rId4"/>
+              </a:rPr>
+              <a:t>/</a:t>
+            </a:r>
+            <a:r>
+              <a:rPr lang="de-DE" dirty="0" smtClean="0"/>
+              <a:t> </a:t>
+            </a:r>
+            <a:endParaRPr lang="de-DE" dirty="0"/>
           </a:p>
         </p:txBody>
       </p:sp>
@@ -5793,7 +7574,7 @@
     </p:spTree>
     <p:extLst>
       <p:ext uri="{BB962C8B-B14F-4D97-AF65-F5344CB8AC3E}">
-        <p14:creationId xmlns:p14="http://schemas.microsoft.com/office/powerpoint/2010/main" val="2830628816"/>
+        <p14:creationId xmlns:p14="http://schemas.microsoft.com/office/powerpoint/2010/main" val="3642317024"/>
       </p:ext>
     </p:extLst>
   </p:cSld>
@@ -5850,7 +7631,37 @@
                   </a:schemeClr>
                 </a:solidFill>
               </a:rPr>
-              <a:t>PROJECT METHODOLOGY</a:t>
+              <a:t>Software </a:t>
+            </a:r>
+            <a:r>
+              <a:rPr lang="de-DE" dirty="0" err="1" smtClean="0">
+                <a:solidFill>
+                  <a:schemeClr val="bg1">
+                    <a:lumMod val="50000"/>
+                  </a:schemeClr>
+                </a:solidFill>
+              </a:rPr>
+              <a:t>Requirements</a:t>
+            </a:r>
+            <a:r>
+              <a:rPr lang="de-DE" dirty="0" smtClean="0">
+                <a:solidFill>
+                  <a:schemeClr val="bg1">
+                    <a:lumMod val="50000"/>
+                  </a:schemeClr>
+                </a:solidFill>
+              </a:rPr>
+              <a:t> </a:t>
+            </a:r>
+            <a:r>
+              <a:rPr lang="de-DE" dirty="0" err="1" smtClean="0">
+                <a:solidFill>
+                  <a:schemeClr val="bg1">
+                    <a:lumMod val="50000"/>
+                  </a:schemeClr>
+                </a:solidFill>
+              </a:rPr>
+              <a:t>Specification</a:t>
             </a:r>
             <a:endParaRPr lang="de-DE" dirty="0">
               <a:solidFill>
@@ -5877,48 +7688,6 @@
           <a:bodyPr/>
           <a:lstStyle/>
           <a:p>
-            <a:r>
-              <a:rPr lang="de-DE" dirty="0" smtClean="0"/>
-              <a:t>Agile (iterativ)</a:t>
-            </a:r>
-          </a:p>
-          <a:p>
-            <a:r>
-              <a:rPr lang="de-DE" dirty="0" smtClean="0"/>
-              <a:t>Vorgehensmodell: </a:t>
-            </a:r>
-            <a:r>
-              <a:rPr lang="de-DE" dirty="0" err="1" smtClean="0"/>
-              <a:t>rup</a:t>
-            </a:r>
-            <a:r>
-              <a:rPr lang="de-DE" dirty="0" smtClean="0"/>
-              <a:t> + GANTT-CHART</a:t>
-            </a:r>
-          </a:p>
-          <a:p>
-            <a:r>
-              <a:rPr lang="de-DE" dirty="0" err="1" smtClean="0"/>
-              <a:t>Scrum</a:t>
-            </a:r>
-            <a:r>
-              <a:rPr lang="de-DE" dirty="0" smtClean="0"/>
-              <a:t> </a:t>
-            </a:r>
-            <a:r>
-              <a:rPr lang="de-DE" dirty="0" err="1" smtClean="0"/>
-              <a:t>board</a:t>
-            </a:r>
-            <a:r>
-              <a:rPr lang="de-DE" dirty="0" smtClean="0"/>
-              <a:t> (JIRA)</a:t>
-            </a:r>
-          </a:p>
-          <a:p>
-            <a:r>
-              <a:rPr lang="de-DE" dirty="0" smtClean="0"/>
-              <a:t>Zeitschätzung: Stunden</a:t>
-            </a:r>
             <a:endParaRPr lang="de-DE" dirty="0"/>
           </a:p>
         </p:txBody>
@@ -5949,7 +7718,7 @@
     </p:spTree>
     <p:extLst>
       <p:ext uri="{BB962C8B-B14F-4D97-AF65-F5344CB8AC3E}">
-        <p14:creationId xmlns:p14="http://schemas.microsoft.com/office/powerpoint/2010/main" val="1394839781"/>
+        <p14:creationId xmlns:p14="http://schemas.microsoft.com/office/powerpoint/2010/main" val="2830628816"/>
       </p:ext>
     </p:extLst>
   </p:cSld>
@@ -6006,7 +7775,7 @@
                   </a:schemeClr>
                 </a:solidFill>
               </a:rPr>
-              <a:t>ARCHITEKTUR</a:t>
+              <a:t>GANTT-CHART</a:t>
             </a:r>
             <a:endParaRPr lang="de-DE" dirty="0">
               <a:solidFill>
@@ -6030,10 +7799,22 @@
         </p:nvSpPr>
         <p:spPr/>
         <p:txBody>
-          <a:bodyPr/>
-          <a:lstStyle/>
-          <a:p>
-            <a:endParaRPr lang="de-DE"/>
+          <a:bodyPr>
+            <a:normAutofit/>
+          </a:bodyPr>
+          <a:lstStyle/>
+          <a:p>
+            <a:r>
+              <a:rPr lang="de-DE" sz="1900" dirty="0" smtClean="0">
+                <a:hlinkClick r:id="rId2"/>
+              </a:rPr>
+              <a:t>https://github.com/nappydevelopment/docs/blob/master/pdfs/SE_GanttChart_UntilMidterm.pdf</a:t>
+            </a:r>
+            <a:r>
+              <a:rPr lang="de-DE" sz="1900" dirty="0" smtClean="0"/>
+              <a:t> </a:t>
+            </a:r>
+            <a:endParaRPr lang="de-DE" sz="1900" dirty="0" smtClean="0"/>
           </a:p>
         </p:txBody>
       </p:sp>
@@ -6063,7 +7844,7 @@
     </p:spTree>
     <p:extLst>
       <p:ext uri="{BB962C8B-B14F-4D97-AF65-F5344CB8AC3E}">
-        <p14:creationId xmlns:p14="http://schemas.microsoft.com/office/powerpoint/2010/main" val="2999327494"/>
+        <p14:creationId xmlns:p14="http://schemas.microsoft.com/office/powerpoint/2010/main" val="1394839781"/>
       </p:ext>
     </p:extLst>
   </p:cSld>
@@ -6120,7 +7901,7 @@
                   </a:schemeClr>
                 </a:solidFill>
               </a:rPr>
-              <a:t>CLASS DIAGRAM</a:t>
+              <a:t>JIRA</a:t>
             </a:r>
             <a:endParaRPr lang="de-DE" dirty="0">
               <a:solidFill>
@@ -6147,7 +7928,22 @@
           <a:bodyPr/>
           <a:lstStyle/>
           <a:p>
-            <a:endParaRPr lang="de-DE"/>
+            <a:r>
+              <a:rPr lang="de-DE" sz="1800" dirty="0">
+                <a:hlinkClick r:id="rId2"/>
+              </a:rPr>
+              <a:t>http://</a:t>
+            </a:r>
+            <a:r>
+              <a:rPr lang="de-DE" sz="1800" dirty="0" smtClean="0">
+                <a:hlinkClick r:id="rId2"/>
+              </a:rPr>
+              <a:t>193.196.7.27:8080/secure/RapidBoard.jspa?rapidView=8&amp;projectKey=NAP&amp;view=planning.nodetail</a:t>
+            </a:r>
+            <a:endParaRPr lang="de-DE" sz="1800" dirty="0" smtClean="0"/>
+          </a:p>
+          <a:p>
+            <a:endParaRPr lang="de-DE" dirty="0" smtClean="0"/>
           </a:p>
         </p:txBody>
       </p:sp>
@@ -6174,10 +7970,51 @@
           </a:p>
         </p:txBody>
       </p:sp>
+      <p:pic>
+        <p:nvPicPr>
+          <p:cNvPr id="1026" name="Picture 2" descr="C:\Users\mincekara\Desktop\2015-12-08 16_02_54-Nappy, the ingenious - Agile Board - JIRA.png"/>
+          <p:cNvPicPr>
+            <a:picLocks noChangeAspect="1" noChangeArrowheads="1"/>
+          </p:cNvPicPr>
+          <p:nvPr/>
+        </p:nvPicPr>
+        <p:blipFill>
+          <a:blip r:embed="rId3">
+            <a:extLst>
+              <a:ext uri="{28A0092B-C50C-407E-A947-70E740481C1C}">
+                <a14:useLocalDpi xmlns:a14="http://schemas.microsoft.com/office/drawing/2010/main" val="0"/>
+              </a:ext>
+            </a:extLst>
+          </a:blip>
+          <a:srcRect/>
+          <a:stretch>
+            <a:fillRect/>
+          </a:stretch>
+        </p:blipFill>
+        <p:spPr bwMode="auto">
+          <a:xfrm>
+            <a:off x="0" y="2222500"/>
+            <a:ext cx="12192000" cy="4073525"/>
+          </a:xfrm>
+          <a:prstGeom prst="rect">
+            <a:avLst/>
+          </a:prstGeom>
+          <a:noFill/>
+          <a:extLst>
+            <a:ext uri="{909E8E84-426E-40DD-AFC4-6F175D3DCCD1}">
+              <a14:hiddenFill xmlns:a14="http://schemas.microsoft.com/office/drawing/2010/main">
+                <a:solidFill>
+                  <a:srgbClr val="FFFFFF"/>
+                </a:solidFill>
+              </a14:hiddenFill>
+            </a:ext>
+          </a:extLst>
+        </p:spPr>
+      </p:pic>
     </p:spTree>
     <p:extLst>
       <p:ext uri="{BB962C8B-B14F-4D97-AF65-F5344CB8AC3E}">
-        <p14:creationId xmlns:p14="http://schemas.microsoft.com/office/powerpoint/2010/main" val="3717575877"/>
+        <p14:creationId xmlns:p14="http://schemas.microsoft.com/office/powerpoint/2010/main" val="1991744233"/>
       </p:ext>
     </p:extLst>
   </p:cSld>
@@ -6471,7 +8308,7 @@
   <a:extraClrSchemeLst/>
   <a:extLst>
     <a:ext uri="{05A4C25C-085E-4340-85A3-A5531E510DB2}">
-      <thm15:themeFamily xmlns:thm15="http://schemas.microsoft.com/office/thememl/2012/main" xmlns="" name="Retrospect" id="{5F128B03-DCCA-4EEB-AB3B-CF2899314A46}" vid="{3F1AAB62-24C6-49D2-8E01-B56FAC9A3DCD}"/>
+      <thm15:themeFamily xmlns="" xmlns:thm15="http://schemas.microsoft.com/office/thememl/2012/main" name="Retrospect" id="{5F128B03-DCCA-4EEB-AB3B-CF2899314A46}" vid="{3F1AAB62-24C6-49D2-8E01-B56FAC9A3DCD}"/>
     </a:ext>
   </a:extLst>
 </a:theme>
@@ -6732,7 +8569,7 @@
   <a:extraClrSchemeLst/>
   <a:extLst>
     <a:ext uri="{05A4C25C-085E-4340-85A3-A5531E510DB2}">
-      <thm15:themeFamily xmlns:thm15="http://schemas.microsoft.com/office/thememl/2012/main" xmlns="" name="Office Theme" id="{62F939B6-93AF-4DB8-9C6B-D6C7DFDC589F}" vid="{4A3C46E8-61CC-4603-A589-7422A47A8E4A}"/>
+      <thm15:themeFamily xmlns="" xmlns:thm15="http://schemas.microsoft.com/office/thememl/2012/main" name="Office Theme" id="{62F939B6-93AF-4DB8-9C6B-D6C7DFDC589F}" vid="{4A3C46E8-61CC-4603-A589-7422A47A8E4A}"/>
     </a:ext>
   </a:extLst>
 </a:theme>

</xml_diff>

<commit_message>
Update Midterm - PPP
</commit_message>
<xml_diff>
--- a/Midterm-PPP.pptx
+++ b/Midterm-PPP.pptx
@@ -5,7 +5,7 @@
     <p:sldMasterId id="2147483684" r:id="rId1"/>
   </p:sldMasterIdLst>
   <p:notesMasterIdLst>
-    <p:notesMasterId r:id="rId16"/>
+    <p:notesMasterId r:id="rId19"/>
   </p:notesMasterIdLst>
   <p:sldIdLst>
     <p:sldId id="256" r:id="rId2"/>
@@ -15,13 +15,16 @@
     <p:sldId id="259" r:id="rId6"/>
     <p:sldId id="260" r:id="rId7"/>
     <p:sldId id="262" r:id="rId8"/>
-    <p:sldId id="271" r:id="rId9"/>
-    <p:sldId id="264" r:id="rId10"/>
-    <p:sldId id="263" r:id="rId11"/>
-    <p:sldId id="272" r:id="rId12"/>
-    <p:sldId id="268" r:id="rId13"/>
-    <p:sldId id="273" r:id="rId14"/>
-    <p:sldId id="269" r:id="rId15"/>
+    <p:sldId id="274" r:id="rId9"/>
+    <p:sldId id="271" r:id="rId10"/>
+    <p:sldId id="275" r:id="rId11"/>
+    <p:sldId id="264" r:id="rId12"/>
+    <p:sldId id="276" r:id="rId13"/>
+    <p:sldId id="263" r:id="rId14"/>
+    <p:sldId id="272" r:id="rId15"/>
+    <p:sldId id="268" r:id="rId16"/>
+    <p:sldId id="273" r:id="rId17"/>
+    <p:sldId id="269" r:id="rId18"/>
   </p:sldIdLst>
   <p:sldSz cx="12192000" cy="6858000"/>
   <p:notesSz cx="6858000" cy="9144000"/>
@@ -122,7 +125,7 @@
   </p:defaultTextStyle>
   <p:extLst>
     <p:ext uri="{EFAFB233-063F-42B5-8137-9DF3F51BA10A}">
-      <p15:sldGuideLst xmlns:p15="http://schemas.microsoft.com/office/powerpoint/2012/main" xmlns="">
+      <p15:sldGuideLst xmlns="" xmlns:p15="http://schemas.microsoft.com/office/powerpoint/2012/main">
         <p15:guide id="1" orient="horz" pos="2160">
           <p15:clr>
             <a:srgbClr val="A4A3A4"/>
@@ -577,6 +580,94 @@
 </p:notes>
 </file>
 
+<file path=ppt/notesSlides/notesSlide10.xml><?xml version="1.0" encoding="utf-8"?>
+<p:notes xmlns:a="http://schemas.openxmlformats.org/drawingml/2006/main" xmlns:r="http://schemas.openxmlformats.org/officeDocument/2006/relationships" xmlns:p="http://schemas.openxmlformats.org/presentationml/2006/main">
+  <p:cSld>
+    <p:spTree>
+      <p:nvGrpSpPr>
+        <p:cNvPr id="1" name=""/>
+        <p:cNvGrpSpPr/>
+        <p:nvPr/>
+      </p:nvGrpSpPr>
+      <p:grpSpPr>
+        <a:xfrm>
+          <a:off x="0" y="0"/>
+          <a:ext cx="0" cy="0"/>
+          <a:chOff x="0" y="0"/>
+          <a:chExt cx="0" cy="0"/>
+        </a:xfrm>
+      </p:grpSpPr>
+      <p:sp>
+        <p:nvSpPr>
+          <p:cNvPr id="2" name="Folienbildplatzhalter 1"/>
+          <p:cNvSpPr>
+            <a:spLocks noGrp="1" noRot="1" noChangeAspect="1"/>
+          </p:cNvSpPr>
+          <p:nvPr>
+            <p:ph type="sldImg"/>
+          </p:nvPr>
+        </p:nvSpPr>
+        <p:spPr/>
+      </p:sp>
+      <p:sp>
+        <p:nvSpPr>
+          <p:cNvPr id="3" name="Notizenplatzhalter 2"/>
+          <p:cNvSpPr>
+            <a:spLocks noGrp="1"/>
+          </p:cNvSpPr>
+          <p:nvPr>
+            <p:ph type="body" idx="1"/>
+          </p:nvPr>
+        </p:nvSpPr>
+        <p:spPr/>
+        <p:txBody>
+          <a:bodyPr/>
+          <a:lstStyle/>
+          <a:p>
+            <a:r>
+              <a:rPr lang="de-DE" dirty="0" smtClean="0"/>
+              <a:t>MANU</a:t>
+            </a:r>
+            <a:endParaRPr lang="de-DE" dirty="0"/>
+          </a:p>
+        </p:txBody>
+      </p:sp>
+      <p:sp>
+        <p:nvSpPr>
+          <p:cNvPr id="4" name="Foliennummernplatzhalter 3"/>
+          <p:cNvSpPr>
+            <a:spLocks noGrp="1"/>
+          </p:cNvSpPr>
+          <p:nvPr>
+            <p:ph type="sldNum" sz="quarter" idx="10"/>
+          </p:nvPr>
+        </p:nvSpPr>
+        <p:spPr/>
+        <p:txBody>
+          <a:bodyPr/>
+          <a:lstStyle/>
+          <a:p>
+            <a:fld id="{4C40B096-980F-4B1D-B616-BA01D9772A24}" type="slidenum">
+              <a:rPr lang="de-DE" smtClean="0"/>
+              <a:t>16</a:t>
+            </a:fld>
+            <a:endParaRPr lang="de-DE"/>
+          </a:p>
+        </p:txBody>
+      </p:sp>
+    </p:spTree>
+    <p:extLst>
+      <p:ext uri="{BB962C8B-B14F-4D97-AF65-F5344CB8AC3E}">
+        <p14:creationId xmlns:p14="http://schemas.microsoft.com/office/powerpoint/2010/main" val="3050164613"/>
+      </p:ext>
+    </p:extLst>
+  </p:cSld>
+  <p:clrMapOvr>
+    <a:masterClrMapping/>
+  </p:clrMapOvr>
+</p:notes>
+</file>
+
 <file path=ppt/notesSlides/notesSlide2.xml><?xml version="1.0" encoding="utf-8"?>
 <p:notes xmlns:a="http://schemas.openxmlformats.org/drawingml/2006/main" xmlns:r="http://schemas.openxmlformats.org/officeDocument/2006/relationships" xmlns:p="http://schemas.openxmlformats.org/presentationml/2006/main">
   <p:cSld>
@@ -910,7 +1001,7 @@
           <a:p>
             <a:fld id="{4C40B096-980F-4B1D-B616-BA01D9772A24}" type="slidenum">
               <a:rPr lang="de-DE" smtClean="0"/>
-              <a:t>9</a:t>
+              <a:t>11</a:t>
             </a:fld>
             <a:endParaRPr lang="de-DE"/>
           </a:p>
@@ -975,7 +1066,7 @@
           <a:p>
             <a:r>
               <a:rPr lang="de-DE" dirty="0" smtClean="0"/>
-              <a:t>MARVIN</a:t>
+              <a:t>MARC</a:t>
             </a:r>
             <a:endParaRPr lang="de-DE" dirty="0"/>
           </a:p>
@@ -998,7 +1089,7 @@
           <a:p>
             <a:fld id="{4C40B096-980F-4B1D-B616-BA01D9772A24}" type="slidenum">
               <a:rPr lang="de-DE" smtClean="0"/>
-              <a:t>10</a:t>
+              <a:t>12</a:t>
             </a:fld>
             <a:endParaRPr lang="de-DE"/>
           </a:p>
@@ -1007,7 +1098,7 @@
     </p:spTree>
     <p:extLst>
       <p:ext uri="{BB962C8B-B14F-4D97-AF65-F5344CB8AC3E}">
-        <p14:creationId xmlns:p14="http://schemas.microsoft.com/office/powerpoint/2010/main" val="22202235"/>
+        <p14:creationId xmlns:p14="http://schemas.microsoft.com/office/powerpoint/2010/main" val="1007455932"/>
       </p:ext>
     </p:extLst>
   </p:cSld>
@@ -1086,7 +1177,7 @@
           <a:p>
             <a:fld id="{4C40B096-980F-4B1D-B616-BA01D9772A24}" type="slidenum">
               <a:rPr lang="de-DE" smtClean="0"/>
-              <a:t>11</a:t>
+              <a:t>13</a:t>
             </a:fld>
             <a:endParaRPr lang="de-DE"/>
           </a:p>
@@ -1095,7 +1186,7 @@
     </p:spTree>
     <p:extLst>
       <p:ext uri="{BB962C8B-B14F-4D97-AF65-F5344CB8AC3E}">
-        <p14:creationId xmlns:p14="http://schemas.microsoft.com/office/powerpoint/2010/main" val="3188059666"/>
+        <p14:creationId xmlns:p14="http://schemas.microsoft.com/office/powerpoint/2010/main" val="22202235"/>
       </p:ext>
     </p:extLst>
   </p:cSld>
@@ -1151,7 +1242,7 @@
           <a:p>
             <a:r>
               <a:rPr lang="de-DE" dirty="0" smtClean="0"/>
-              <a:t>MANU</a:t>
+              <a:t>MARVIN</a:t>
             </a:r>
             <a:endParaRPr lang="de-DE" dirty="0"/>
           </a:p>
@@ -1174,7 +1265,7 @@
           <a:p>
             <a:fld id="{4C40B096-980F-4B1D-B616-BA01D9772A24}" type="slidenum">
               <a:rPr lang="de-DE" smtClean="0"/>
-              <a:t>12</a:t>
+              <a:t>14</a:t>
             </a:fld>
             <a:endParaRPr lang="de-DE"/>
           </a:p>
@@ -1183,7 +1274,7 @@
     </p:spTree>
     <p:extLst>
       <p:ext uri="{BB962C8B-B14F-4D97-AF65-F5344CB8AC3E}">
-        <p14:creationId xmlns:p14="http://schemas.microsoft.com/office/powerpoint/2010/main" val="3050164613"/>
+        <p14:creationId xmlns:p14="http://schemas.microsoft.com/office/powerpoint/2010/main" val="3188059666"/>
       </p:ext>
     </p:extLst>
   </p:cSld>
@@ -1262,7 +1353,7 @@
           <a:p>
             <a:fld id="{4C40B096-980F-4B1D-B616-BA01D9772A24}" type="slidenum">
               <a:rPr lang="de-DE" smtClean="0"/>
-              <a:t>13</a:t>
+              <a:t>15</a:t>
             </a:fld>
             <a:endParaRPr lang="de-DE"/>
           </a:p>
@@ -5212,6 +5303,463 @@
             <p:ph type="title"/>
           </p:nvPr>
         </p:nvSpPr>
+        <p:spPr>
+          <a:xfrm>
+            <a:off x="1097280" y="286603"/>
+            <a:ext cx="10058400" cy="1450757"/>
+          </a:xfrm>
+        </p:spPr>
+        <p:txBody>
+          <a:bodyPr/>
+          <a:lstStyle/>
+          <a:p>
+            <a:r>
+              <a:rPr lang="de-DE" dirty="0" smtClean="0">
+                <a:solidFill>
+                  <a:schemeClr val="bg1">
+                    <a:lumMod val="50000"/>
+                  </a:schemeClr>
+                </a:solidFill>
+              </a:rPr>
+              <a:t>JIRA &amp; BURNDOWN-DIAGRAMM</a:t>
+            </a:r>
+            <a:endParaRPr lang="de-DE" dirty="0">
+              <a:solidFill>
+                <a:schemeClr val="bg1">
+                  <a:lumMod val="50000"/>
+                </a:schemeClr>
+              </a:solidFill>
+            </a:endParaRPr>
+          </a:p>
+        </p:txBody>
+      </p:sp>
+      <p:sp>
+        <p:nvSpPr>
+          <p:cNvPr id="5" name="Foliennummernplatzhalter 4"/>
+          <p:cNvSpPr>
+            <a:spLocks noGrp="1"/>
+          </p:cNvSpPr>
+          <p:nvPr>
+            <p:ph type="sldNum" sz="quarter" idx="12"/>
+          </p:nvPr>
+        </p:nvSpPr>
+        <p:spPr/>
+        <p:txBody>
+          <a:bodyPr/>
+          <a:lstStyle/>
+          <a:p>
+            <a:fld id="{BEA2534F-1EDD-48ED-BC5A-02D188FC5C63}" type="slidenum">
+              <a:rPr lang="de-DE" smtClean="0"/>
+              <a:t>10</a:t>
+            </a:fld>
+            <a:endParaRPr lang="de-DE" dirty="0"/>
+          </a:p>
+        </p:txBody>
+      </p:sp>
+      <p:pic>
+        <p:nvPicPr>
+          <p:cNvPr id="1026" name="Picture 2" descr="C:\Users\mincekara\Desktop\2015-12-08 16_02_54-Nappy, the ingenious - Agile Board - JIRA.png"/>
+          <p:cNvPicPr>
+            <a:picLocks noChangeAspect="1" noChangeArrowheads="1"/>
+          </p:cNvPicPr>
+          <p:nvPr/>
+        </p:nvPicPr>
+        <p:blipFill>
+          <a:blip r:embed="rId2">
+            <a:extLst>
+              <a:ext uri="{28A0092B-C50C-407E-A947-70E740481C1C}">
+                <a14:useLocalDpi xmlns:a14="http://schemas.microsoft.com/office/drawing/2010/main" val="0"/>
+              </a:ext>
+            </a:extLst>
+          </a:blip>
+          <a:srcRect/>
+          <a:stretch>
+            <a:fillRect/>
+          </a:stretch>
+        </p:blipFill>
+        <p:spPr bwMode="auto">
+          <a:xfrm>
+            <a:off x="0" y="2015666"/>
+            <a:ext cx="12192000" cy="4073525"/>
+          </a:xfrm>
+          <a:prstGeom prst="rect">
+            <a:avLst/>
+          </a:prstGeom>
+          <a:noFill/>
+          <a:extLst>
+            <a:ext uri="{909E8E84-426E-40DD-AFC4-6F175D3DCCD1}">
+              <a14:hiddenFill xmlns:a14="http://schemas.microsoft.com/office/drawing/2010/main">
+                <a:solidFill>
+                  <a:srgbClr val="FFFFFF"/>
+                </a:solidFill>
+              </a14:hiddenFill>
+            </a:ext>
+          </a:extLst>
+        </p:spPr>
+      </p:pic>
+    </p:spTree>
+    <p:extLst>
+      <p:ext uri="{BB962C8B-B14F-4D97-AF65-F5344CB8AC3E}">
+        <p14:creationId xmlns:p14="http://schemas.microsoft.com/office/powerpoint/2010/main" val="3107559251"/>
+      </p:ext>
+    </p:extLst>
+  </p:cSld>
+  <p:clrMapOvr>
+    <a:masterClrMapping/>
+  </p:clrMapOvr>
+  <p:timing>
+    <p:tnLst>
+      <p:par>
+        <p:cTn id="1" dur="indefinite" restart="never" nodeType="tmRoot"/>
+      </p:par>
+    </p:tnLst>
+  </p:timing>
+</p:sld>
+</file>
+
+<file path=ppt/slides/slide11.xml><?xml version="1.0" encoding="utf-8"?>
+<p:sld xmlns:a="http://schemas.openxmlformats.org/drawingml/2006/main" xmlns:r="http://schemas.openxmlformats.org/officeDocument/2006/relationships" xmlns:p="http://schemas.openxmlformats.org/presentationml/2006/main">
+  <p:cSld>
+    <p:spTree>
+      <p:nvGrpSpPr>
+        <p:cNvPr id="1" name=""/>
+        <p:cNvGrpSpPr/>
+        <p:nvPr/>
+      </p:nvGrpSpPr>
+      <p:grpSpPr>
+        <a:xfrm>
+          <a:off x="0" y="0"/>
+          <a:ext cx="0" cy="0"/>
+          <a:chOff x="0" y="0"/>
+          <a:chExt cx="0" cy="0"/>
+        </a:xfrm>
+      </p:grpSpPr>
+      <p:sp>
+        <p:nvSpPr>
+          <p:cNvPr id="2" name="Titel 1"/>
+          <p:cNvSpPr>
+            <a:spLocks noGrp="1"/>
+          </p:cNvSpPr>
+          <p:nvPr>
+            <p:ph type="title"/>
+          </p:nvPr>
+        </p:nvSpPr>
+        <p:spPr/>
+        <p:txBody>
+          <a:bodyPr/>
+          <a:lstStyle/>
+          <a:p>
+            <a:r>
+              <a:rPr lang="de-DE" dirty="0" smtClean="0">
+                <a:solidFill>
+                  <a:schemeClr val="bg1">
+                    <a:lumMod val="50000"/>
+                  </a:schemeClr>
+                </a:solidFill>
+              </a:rPr>
+              <a:t>CLASS </a:t>
+            </a:r>
+            <a:r>
+              <a:rPr lang="de-DE" dirty="0" smtClean="0">
+                <a:solidFill>
+                  <a:schemeClr val="bg1">
+                    <a:lumMod val="50000"/>
+                  </a:schemeClr>
+                </a:solidFill>
+              </a:rPr>
+              <a:t>DIAGRAM &amp; ARCHITEKTUR</a:t>
+            </a:r>
+            <a:endParaRPr lang="de-DE" dirty="0">
+              <a:solidFill>
+                <a:schemeClr val="bg1">
+                  <a:lumMod val="50000"/>
+                </a:schemeClr>
+              </a:solidFill>
+            </a:endParaRPr>
+          </a:p>
+        </p:txBody>
+      </p:sp>
+      <p:sp>
+        <p:nvSpPr>
+          <p:cNvPr id="5" name="Foliennummernplatzhalter 4"/>
+          <p:cNvSpPr>
+            <a:spLocks noGrp="1"/>
+          </p:cNvSpPr>
+          <p:nvPr>
+            <p:ph type="sldNum" sz="quarter" idx="12"/>
+          </p:nvPr>
+        </p:nvSpPr>
+        <p:spPr/>
+        <p:txBody>
+          <a:bodyPr/>
+          <a:lstStyle/>
+          <a:p>
+            <a:fld id="{BEA2534F-1EDD-48ED-BC5A-02D188FC5C63}" type="slidenum">
+              <a:rPr lang="de-DE" smtClean="0"/>
+              <a:t>11</a:t>
+            </a:fld>
+            <a:endParaRPr lang="de-DE" dirty="0"/>
+          </a:p>
+        </p:txBody>
+      </p:sp>
+      <p:pic>
+        <p:nvPicPr>
+          <p:cNvPr id="3074" name="Picture 2" descr="C:\Users\mincekara\Desktop\2015-12-09 13_03_09-Mozilla Firefox.png"/>
+          <p:cNvPicPr>
+            <a:picLocks noChangeAspect="1" noChangeArrowheads="1"/>
+          </p:cNvPicPr>
+          <p:nvPr/>
+        </p:nvPicPr>
+        <p:blipFill>
+          <a:blip r:embed="rId3">
+            <a:extLst>
+              <a:ext uri="{28A0092B-C50C-407E-A947-70E740481C1C}">
+                <a14:useLocalDpi xmlns:a14="http://schemas.microsoft.com/office/drawing/2010/main" val="0"/>
+              </a:ext>
+            </a:extLst>
+          </a:blip>
+          <a:srcRect/>
+          <a:stretch>
+            <a:fillRect/>
+          </a:stretch>
+        </p:blipFill>
+        <p:spPr bwMode="auto">
+          <a:xfrm>
+            <a:off x="1224642" y="1755999"/>
+            <a:ext cx="9742716" cy="4499498"/>
+          </a:xfrm>
+          <a:prstGeom prst="rect">
+            <a:avLst/>
+          </a:prstGeom>
+          <a:noFill/>
+          <a:extLst>
+            <a:ext uri="{909E8E84-426E-40DD-AFC4-6F175D3DCCD1}">
+              <a14:hiddenFill xmlns:a14="http://schemas.microsoft.com/office/drawing/2010/main">
+                <a:solidFill>
+                  <a:srgbClr val="FFFFFF"/>
+                </a:solidFill>
+              </a14:hiddenFill>
+            </a:ext>
+          </a:extLst>
+        </p:spPr>
+      </p:pic>
+      <p:sp>
+        <p:nvSpPr>
+          <p:cNvPr id="4" name="Rechteck 3"/>
+          <p:cNvSpPr/>
+          <p:nvPr/>
+        </p:nvSpPr>
+        <p:spPr>
+          <a:xfrm>
+            <a:off x="413657" y="5332167"/>
+            <a:ext cx="5116286" cy="923330"/>
+          </a:xfrm>
+          <a:prstGeom prst="rect">
+            <a:avLst/>
+          </a:prstGeom>
+        </p:spPr>
+        <p:txBody>
+          <a:bodyPr wrap="square">
+            <a:spAutoFit/>
+          </a:bodyPr>
+          <a:lstStyle/>
+          <a:p>
+            <a:r>
+              <a:rPr lang="de-DE" dirty="0"/>
+              <a:t>Class </a:t>
+            </a:r>
+            <a:r>
+              <a:rPr lang="de-DE" dirty="0" err="1"/>
+              <a:t>diagram</a:t>
+            </a:r>
+            <a:r>
+              <a:rPr lang="de-DE" dirty="0"/>
+              <a:t>: </a:t>
+            </a:r>
+            <a:r>
+              <a:rPr lang="de-DE" dirty="0">
+                <a:hlinkClick r:id="rId4"/>
+              </a:rPr>
+              <a:t>https://github.com/nappydevelopment/docs/blob/master/svg/New%20Classdiagram.svg</a:t>
+            </a:r>
+            <a:endParaRPr lang="de-DE" dirty="0"/>
+          </a:p>
+        </p:txBody>
+      </p:sp>
+    </p:spTree>
+    <p:extLst>
+      <p:ext uri="{BB962C8B-B14F-4D97-AF65-F5344CB8AC3E}">
+        <p14:creationId xmlns:p14="http://schemas.microsoft.com/office/powerpoint/2010/main" val="3717575877"/>
+      </p:ext>
+    </p:extLst>
+  </p:cSld>
+  <p:clrMapOvr>
+    <a:masterClrMapping/>
+  </p:clrMapOvr>
+  <p:timing>
+    <p:tnLst>
+      <p:par>
+        <p:cTn id="1" dur="indefinite" restart="never" nodeType="tmRoot"/>
+      </p:par>
+    </p:tnLst>
+  </p:timing>
+</p:sld>
+</file>
+
+<file path=ppt/slides/slide12.xml><?xml version="1.0" encoding="utf-8"?>
+<p:sld xmlns:a="http://schemas.openxmlformats.org/drawingml/2006/main" xmlns:r="http://schemas.openxmlformats.org/officeDocument/2006/relationships" xmlns:p="http://schemas.openxmlformats.org/presentationml/2006/main">
+  <p:cSld>
+    <p:spTree>
+      <p:nvGrpSpPr>
+        <p:cNvPr id="1" name=""/>
+        <p:cNvGrpSpPr/>
+        <p:nvPr/>
+      </p:nvGrpSpPr>
+      <p:grpSpPr>
+        <a:xfrm>
+          <a:off x="0" y="0"/>
+          <a:ext cx="0" cy="0"/>
+          <a:chOff x="0" y="0"/>
+          <a:chExt cx="0" cy="0"/>
+        </a:xfrm>
+      </p:grpSpPr>
+      <p:sp>
+        <p:nvSpPr>
+          <p:cNvPr id="2" name="Titel 1"/>
+          <p:cNvSpPr>
+            <a:spLocks noGrp="1"/>
+          </p:cNvSpPr>
+          <p:nvPr>
+            <p:ph type="title"/>
+          </p:nvPr>
+        </p:nvSpPr>
+        <p:spPr/>
+        <p:txBody>
+          <a:bodyPr/>
+          <a:lstStyle/>
+          <a:p>
+            <a:r>
+              <a:rPr lang="de-DE" dirty="0" smtClean="0">
+                <a:solidFill>
+                  <a:schemeClr val="bg1">
+                    <a:lumMod val="50000"/>
+                  </a:schemeClr>
+                </a:solidFill>
+              </a:rPr>
+              <a:t>CLASS </a:t>
+            </a:r>
+            <a:r>
+              <a:rPr lang="de-DE" dirty="0" smtClean="0">
+                <a:solidFill>
+                  <a:schemeClr val="bg1">
+                    <a:lumMod val="50000"/>
+                  </a:schemeClr>
+                </a:solidFill>
+              </a:rPr>
+              <a:t>DIAGRAM &amp; ARCHITEKTUR</a:t>
+            </a:r>
+            <a:endParaRPr lang="de-DE" dirty="0">
+              <a:solidFill>
+                <a:schemeClr val="bg1">
+                  <a:lumMod val="50000"/>
+                </a:schemeClr>
+              </a:solidFill>
+            </a:endParaRPr>
+          </a:p>
+        </p:txBody>
+      </p:sp>
+      <p:sp>
+        <p:nvSpPr>
+          <p:cNvPr id="3" name="Inhaltsplatzhalter 2"/>
+          <p:cNvSpPr>
+            <a:spLocks noGrp="1"/>
+          </p:cNvSpPr>
+          <p:nvPr>
+            <p:ph idx="1"/>
+          </p:nvPr>
+        </p:nvSpPr>
+        <p:spPr/>
+        <p:txBody>
+          <a:bodyPr/>
+          <a:lstStyle/>
+          <a:p>
+            <a:pPr marL="0" indent="0">
+              <a:buNone/>
+            </a:pPr>
+            <a:endParaRPr lang="de-DE" dirty="0"/>
+          </a:p>
+        </p:txBody>
+      </p:sp>
+      <p:sp>
+        <p:nvSpPr>
+          <p:cNvPr id="5" name="Foliennummernplatzhalter 4"/>
+          <p:cNvSpPr>
+            <a:spLocks noGrp="1"/>
+          </p:cNvSpPr>
+          <p:nvPr>
+            <p:ph type="sldNum" sz="quarter" idx="12"/>
+          </p:nvPr>
+        </p:nvSpPr>
+        <p:spPr/>
+        <p:txBody>
+          <a:bodyPr/>
+          <a:lstStyle/>
+          <a:p>
+            <a:fld id="{BEA2534F-1EDD-48ED-BC5A-02D188FC5C63}" type="slidenum">
+              <a:rPr lang="de-DE" smtClean="0"/>
+              <a:t>12</a:t>
+            </a:fld>
+            <a:endParaRPr lang="de-DE" dirty="0"/>
+          </a:p>
+        </p:txBody>
+      </p:sp>
+    </p:spTree>
+    <p:extLst>
+      <p:ext uri="{BB962C8B-B14F-4D97-AF65-F5344CB8AC3E}">
+        <p14:creationId xmlns:p14="http://schemas.microsoft.com/office/powerpoint/2010/main" val="2627783732"/>
+      </p:ext>
+    </p:extLst>
+  </p:cSld>
+  <p:clrMapOvr>
+    <a:masterClrMapping/>
+  </p:clrMapOvr>
+  <p:timing>
+    <p:tnLst>
+      <p:par>
+        <p:cTn id="1" dur="indefinite" restart="never" nodeType="tmRoot"/>
+      </p:par>
+    </p:tnLst>
+  </p:timing>
+</p:sld>
+</file>
+
+<file path=ppt/slides/slide13.xml><?xml version="1.0" encoding="utf-8"?>
+<p:sld xmlns:a="http://schemas.openxmlformats.org/drawingml/2006/main" xmlns:r="http://schemas.openxmlformats.org/officeDocument/2006/relationships" xmlns:p="http://schemas.openxmlformats.org/presentationml/2006/main">
+  <p:cSld>
+    <p:spTree>
+      <p:nvGrpSpPr>
+        <p:cNvPr id="1" name=""/>
+        <p:cNvGrpSpPr/>
+        <p:nvPr/>
+      </p:nvGrpSpPr>
+      <p:grpSpPr>
+        <a:xfrm>
+          <a:off x="0" y="0"/>
+          <a:ext cx="0" cy="0"/>
+          <a:chOff x="0" y="0"/>
+          <a:chExt cx="0" cy="0"/>
+        </a:xfrm>
+      </p:grpSpPr>
+      <p:sp>
+        <p:nvSpPr>
+          <p:cNvPr id="2" name="Titel 1"/>
+          <p:cNvSpPr>
+            <a:spLocks noGrp="1"/>
+          </p:cNvSpPr>
+          <p:nvPr>
+            <p:ph type="title"/>
+          </p:nvPr>
+        </p:nvSpPr>
         <p:spPr/>
         <p:txBody>
           <a:bodyPr/>
@@ -5325,7 +5873,6 @@
               <a:rPr lang="de-DE" dirty="0" smtClean="0"/>
               <a:t>Stern-Schema</a:t>
             </a:r>
-            <a:endParaRPr lang="de-DE" dirty="0" smtClean="0"/>
           </a:p>
           <a:p>
             <a:pPr marL="0" indent="0">
@@ -5352,7 +5899,7 @@
           <a:p>
             <a:fld id="{BEA2534F-1EDD-48ED-BC5A-02D188FC5C63}" type="slidenum">
               <a:rPr lang="de-DE" smtClean="0"/>
-              <a:t>10</a:t>
+              <a:t>13</a:t>
             </a:fld>
             <a:endParaRPr lang="de-DE" dirty="0"/>
           </a:p>
@@ -5419,7 +5966,7 @@
 </p:sld>
 </file>
 
-<file path=ppt/slides/slide11.xml><?xml version="1.0" encoding="utf-8"?>
+<file path=ppt/slides/slide14.xml><?xml version="1.0" encoding="utf-8"?>
 <p:sld xmlns:a="http://schemas.openxmlformats.org/drawingml/2006/main" xmlns:r="http://schemas.openxmlformats.org/officeDocument/2006/relationships" xmlns:p="http://schemas.openxmlformats.org/presentationml/2006/main">
   <p:cSld>
     <p:spTree>
@@ -5510,7 +6057,7 @@
           <a:p>
             <a:fld id="{BEA2534F-1EDD-48ED-BC5A-02D188FC5C63}" type="slidenum">
               <a:rPr lang="de-DE" smtClean="0"/>
-              <a:t>11</a:t>
+              <a:t>14</a:t>
             </a:fld>
             <a:endParaRPr lang="de-DE" dirty="0"/>
           </a:p>
@@ -5577,7 +6124,7 @@
 </p:sld>
 </file>
 
-<file path=ppt/slides/slide12.xml><?xml version="1.0" encoding="utf-8"?>
+<file path=ppt/slides/slide15.xml><?xml version="1.0" encoding="utf-8"?>
 <p:sld xmlns:a="http://schemas.openxmlformats.org/drawingml/2006/main" xmlns:r="http://schemas.openxmlformats.org/officeDocument/2006/relationships" xmlns:p="http://schemas.openxmlformats.org/presentationml/2006/main">
   <p:cSld>
     <p:spTree>
@@ -5721,7 +6268,7 @@
           <a:p>
             <a:fld id="{BEA2534F-1EDD-48ED-BC5A-02D188FC5C63}" type="slidenum">
               <a:rPr lang="de-DE" smtClean="0"/>
-              <a:t>12</a:t>
+              <a:t>15</a:t>
             </a:fld>
             <a:endParaRPr lang="de-DE" dirty="0"/>
           </a:p>
@@ -5747,7 +6294,7 @@
 </p:sld>
 </file>
 
-<file path=ppt/slides/slide13.xml><?xml version="1.0" encoding="utf-8"?>
+<file path=ppt/slides/slide16.xml><?xml version="1.0" encoding="utf-8"?>
 <p:sld xmlns:a="http://schemas.openxmlformats.org/drawingml/2006/main" xmlns:r="http://schemas.openxmlformats.org/officeDocument/2006/relationships" xmlns:p="http://schemas.openxmlformats.org/presentationml/2006/main">
   <p:cSld>
     <p:spTree>
@@ -5923,7 +6470,7 @@
           <a:p>
             <a:fld id="{BEA2534F-1EDD-48ED-BC5A-02D188FC5C63}" type="slidenum">
               <a:rPr lang="de-DE" smtClean="0"/>
-              <a:t>13</a:t>
+              <a:t>16</a:t>
             </a:fld>
             <a:endParaRPr lang="de-DE" dirty="0"/>
           </a:p>
@@ -5949,7 +6496,7 @@
 </p:sld>
 </file>
 
-<file path=ppt/slides/slide14.xml><?xml version="1.0" encoding="utf-8"?>
+<file path=ppt/slides/slide17.xml><?xml version="1.0" encoding="utf-8"?>
 <p:sld xmlns:a="http://schemas.openxmlformats.org/drawingml/2006/main" xmlns:r="http://schemas.openxmlformats.org/officeDocument/2006/relationships" xmlns:p="http://schemas.openxmlformats.org/presentationml/2006/main">
   <p:cSld>
     <p:spTree>
@@ -6117,7 +6664,7 @@
           <a:p>
             <a:fld id="{BEA2534F-1EDD-48ED-BC5A-02D188FC5C63}" type="slidenum">
               <a:rPr lang="de-DE" smtClean="0"/>
-              <a:t>14</a:t>
+              <a:t>17</a:t>
             </a:fld>
             <a:endParaRPr lang="de-DE" dirty="0"/>
           </a:p>
@@ -6351,8 +6898,13 @@
             </a:pPr>
             <a:r>
               <a:rPr lang="de-DE" dirty="0" smtClean="0"/>
-              <a:t>Class Diagramm</a:t>
-            </a:r>
+              <a:t>Class </a:t>
+            </a:r>
+            <a:r>
+              <a:rPr lang="de-DE" dirty="0" smtClean="0"/>
+              <a:t>Diagramm &amp; Architektur</a:t>
+            </a:r>
+            <a:endParaRPr lang="de-DE" dirty="0" smtClean="0"/>
           </a:p>
           <a:p>
             <a:pPr marL="749808" lvl="1" indent="-457200">
@@ -8192,18 +8744,6 @@
               <a:hlinkClick r:id="rId2"/>
             </a:endParaRPr>
           </a:p>
-          <a:p>
-            <a:r>
-              <a:rPr lang="de-DE" sz="1900" dirty="0" smtClean="0">
-                <a:hlinkClick r:id="rId2"/>
-              </a:rPr>
-              <a:t>https://github.com/nappydevelopment/docs/blob/master/pdfs/SE_GanttChart_UntilMidterm.pdf</a:t>
-            </a:r>
-            <a:r>
-              <a:rPr lang="de-DE" sz="1900" dirty="0" smtClean="0"/>
-              <a:t> </a:t>
-            </a:r>
-          </a:p>
         </p:txBody>
       </p:sp>
       <p:sp>
@@ -8251,7 +8791,7 @@
         </p:blipFill>
         <p:spPr>
           <a:xfrm>
-            <a:off x="3768713" y="1911605"/>
+            <a:off x="3768713" y="2194641"/>
             <a:ext cx="4715533" cy="3134162"/>
           </a:xfrm>
           <a:prstGeom prst="rect">
@@ -8319,7 +8859,7 @@
                   </a:schemeClr>
                 </a:solidFill>
               </a:rPr>
-              <a:t>JIRA &amp; BURNDOWN-DIAGRAMM</a:t>
+              <a:t>RUP &amp; GANTT-CHART</a:t>
             </a:r>
             <a:endParaRPr lang="de-DE" dirty="0">
               <a:solidFill>
@@ -8341,27 +8881,68 @@
             <p:ph idx="1"/>
           </p:nvPr>
         </p:nvSpPr>
-        <p:spPr/>
-        <p:txBody>
-          <a:bodyPr/>
-          <a:lstStyle/>
-          <a:p>
-            <a:r>
-              <a:rPr lang="de-DE" sz="1800" dirty="0">
+        <p:spPr>
+          <a:xfrm>
+            <a:off x="1097280" y="2477122"/>
+            <a:ext cx="10058400" cy="4023360"/>
+          </a:xfrm>
+        </p:spPr>
+        <p:txBody>
+          <a:bodyPr>
+            <a:normAutofit/>
+          </a:bodyPr>
+          <a:lstStyle/>
+          <a:p>
+            <a:endParaRPr lang="de-DE" sz="1900" dirty="0" smtClean="0">
+              <a:hlinkClick r:id="rId2"/>
+            </a:endParaRPr>
+          </a:p>
+          <a:p>
+            <a:endParaRPr lang="de-DE" sz="1900" dirty="0">
+              <a:hlinkClick r:id="rId2"/>
+            </a:endParaRPr>
+          </a:p>
+          <a:p>
+            <a:endParaRPr lang="de-DE" sz="1900" dirty="0" smtClean="0">
+              <a:hlinkClick r:id="rId2"/>
+            </a:endParaRPr>
+          </a:p>
+          <a:p>
+            <a:endParaRPr lang="de-DE" sz="1900" dirty="0">
+              <a:hlinkClick r:id="rId2"/>
+            </a:endParaRPr>
+          </a:p>
+          <a:p>
+            <a:endParaRPr lang="de-DE" sz="1900" dirty="0" smtClean="0">
+              <a:hlinkClick r:id="rId2"/>
+            </a:endParaRPr>
+          </a:p>
+          <a:p>
+            <a:endParaRPr lang="de-DE" sz="1900" dirty="0" smtClean="0">
+              <a:hlinkClick r:id="rId2"/>
+            </a:endParaRPr>
+          </a:p>
+          <a:p>
+            <a:endParaRPr lang="de-DE" sz="1900" dirty="0">
+              <a:hlinkClick r:id="rId2"/>
+            </a:endParaRPr>
+          </a:p>
+          <a:p>
+            <a:endParaRPr lang="de-DE" sz="1900" dirty="0">
+              <a:hlinkClick r:id="rId2"/>
+            </a:endParaRPr>
+          </a:p>
+          <a:p>
+            <a:r>
+              <a:rPr lang="de-DE" sz="1900" dirty="0" smtClean="0">
                 <a:hlinkClick r:id="rId2"/>
               </a:rPr>
-              <a:t>http://</a:t>
-            </a:r>
-            <a:r>
-              <a:rPr lang="de-DE" sz="1800" dirty="0" smtClean="0">
-                <a:hlinkClick r:id="rId2"/>
-              </a:rPr>
-              <a:t>193.196.7.27:8080/secure/RapidBoard.jspa?rapidView=8&amp;projectKey=NAP&amp;view=planning.nodetail</a:t>
-            </a:r>
-            <a:endParaRPr lang="de-DE" sz="1800" dirty="0" smtClean="0"/>
-          </a:p>
-          <a:p>
-            <a:endParaRPr lang="de-DE" dirty="0" smtClean="0"/>
+              <a:t>https://github.com/nappydevelopment/docs/blob/master/pdfs/SE_GanttChart_UntilMidterm.pdf</a:t>
+            </a:r>
+            <a:r>
+              <a:rPr lang="de-DE" sz="1900" dirty="0" smtClean="0"/>
+              <a:t> </a:t>
+            </a:r>
           </a:p>
         </p:txBody>
       </p:sp>
@@ -8390,7 +8971,7 @@
       </p:sp>
       <p:pic>
         <p:nvPicPr>
-          <p:cNvPr id="1026" name="Picture 2" descr="C:\Users\mincekara\Desktop\2015-12-08 16_02_54-Nappy, the ingenious - Agile Board - JIRA.png"/>
+          <p:cNvPr id="1026" name="Picture 2" descr="C:\Users\mincekara\Desktop\2015-12-09 12_53_18-Project Professional - SE_GanttChart.mpp.png"/>
           <p:cNvPicPr>
             <a:picLocks noChangeAspect="1" noChangeArrowheads="1"/>
           </p:cNvPicPr>
@@ -8411,8 +8992,8 @@
         </p:blipFill>
         <p:spPr bwMode="auto">
           <a:xfrm>
-            <a:off x="0" y="2222500"/>
-            <a:ext cx="12192000" cy="4073525"/>
+            <a:off x="2651125" y="1863723"/>
+            <a:ext cx="6808561" cy="4013202"/>
           </a:xfrm>
           <a:prstGeom prst="rect">
             <a:avLst/>
@@ -8432,7 +9013,7 @@
     </p:spTree>
     <p:extLst>
       <p:ext uri="{BB962C8B-B14F-4D97-AF65-F5344CB8AC3E}">
-        <p14:creationId xmlns:p14="http://schemas.microsoft.com/office/powerpoint/2010/main" val="1991744233"/>
+        <p14:creationId xmlns:p14="http://schemas.microsoft.com/office/powerpoint/2010/main" val="1201528850"/>
       </p:ext>
     </p:extLst>
   </p:cSld>
@@ -8489,7 +9070,7 @@
                   </a:schemeClr>
                 </a:solidFill>
               </a:rPr>
-              <a:t>CLASS DIAGRAM</a:t>
+              <a:t>JIRA &amp; BURNDOWN-DIAGRAMM</a:t>
             </a:r>
             <a:endParaRPr lang="de-DE" dirty="0">
               <a:solidFill>
@@ -8511,76 +9092,77 @@
             <p:ph idx="1"/>
           </p:nvPr>
         </p:nvSpPr>
-        <p:spPr/>
-        <p:txBody>
-          <a:bodyPr/>
-          <a:lstStyle/>
-          <a:p>
-            <a:r>
-              <a:rPr lang="de-DE" dirty="0" smtClean="0"/>
-              <a:t>Software </a:t>
-            </a:r>
-            <a:r>
-              <a:rPr lang="de-DE" dirty="0" err="1" smtClean="0"/>
-              <a:t>Architecture</a:t>
-            </a:r>
-            <a:r>
-              <a:rPr lang="de-DE" dirty="0" smtClean="0"/>
-              <a:t> </a:t>
-            </a:r>
-            <a:r>
-              <a:rPr lang="de-DE" dirty="0" err="1" smtClean="0"/>
-              <a:t>Document</a:t>
-            </a:r>
-            <a:r>
-              <a:rPr lang="de-DE" dirty="0"/>
-              <a:t>:</a:t>
-            </a:r>
-            <a:br>
-              <a:rPr lang="de-DE" dirty="0"/>
-            </a:br>
-            <a:r>
-              <a:rPr lang="de-DE" dirty="0">
-                <a:hlinkClick r:id="rId3"/>
+        <p:spPr>
+          <a:xfrm>
+            <a:off x="1097280" y="2553324"/>
+            <a:ext cx="10058400" cy="4023360"/>
+          </a:xfrm>
+        </p:spPr>
+        <p:txBody>
+          <a:bodyPr/>
+          <a:lstStyle/>
+          <a:p>
+            <a:endParaRPr lang="de-DE" sz="1800" dirty="0" smtClean="0">
+              <a:hlinkClick r:id="rId2"/>
+            </a:endParaRPr>
+          </a:p>
+          <a:p>
+            <a:endParaRPr lang="de-DE" sz="1800" dirty="0">
+              <a:hlinkClick r:id="rId2"/>
+            </a:endParaRPr>
+          </a:p>
+          <a:p>
+            <a:endParaRPr lang="de-DE" sz="1800" dirty="0" smtClean="0">
+              <a:hlinkClick r:id="rId2"/>
+            </a:endParaRPr>
+          </a:p>
+          <a:p>
+            <a:endParaRPr lang="de-DE" sz="1800" dirty="0">
+              <a:hlinkClick r:id="rId2"/>
+            </a:endParaRPr>
+          </a:p>
+          <a:p>
+            <a:endParaRPr lang="de-DE" sz="1800" dirty="0" smtClean="0">
+              <a:hlinkClick r:id="rId2"/>
+            </a:endParaRPr>
+          </a:p>
+          <a:p>
+            <a:endParaRPr lang="de-DE" sz="1800" dirty="0">
+              <a:hlinkClick r:id="rId2"/>
+            </a:endParaRPr>
+          </a:p>
+          <a:p>
+            <a:endParaRPr lang="de-DE" sz="1800" dirty="0" smtClean="0">
+              <a:hlinkClick r:id="rId2"/>
+            </a:endParaRPr>
+          </a:p>
+          <a:p>
+            <a:endParaRPr lang="de-DE" sz="1800" dirty="0">
+              <a:hlinkClick r:id="rId2"/>
+            </a:endParaRPr>
+          </a:p>
+          <a:p>
+            <a:r>
+              <a:rPr lang="de-DE" sz="1800" dirty="0" smtClean="0">
+                <a:hlinkClick r:id="rId2"/>
               </a:rPr>
-              <a:t>https://</a:t>
-            </a:r>
-            <a:r>
-              <a:rPr lang="de-DE" dirty="0" smtClean="0">
-                <a:hlinkClick r:id="rId3"/>
+              <a:t>http</a:t>
+            </a:r>
+            <a:r>
+              <a:rPr lang="de-DE" sz="1800" dirty="0">
+                <a:hlinkClick r:id="rId2"/>
               </a:rPr>
-              <a:t>github.com/nappydevelopment/docs/blob/master/pdfs/Software%20Architecture%20Document.pdf</a:t>
-            </a:r>
-            <a:r>
-              <a:rPr lang="de-DE" dirty="0" smtClean="0"/>
-              <a:t> </a:t>
-            </a:r>
-          </a:p>
-          <a:p>
-            <a:r>
-              <a:rPr lang="de-DE" dirty="0"/>
-              <a:t>Class </a:t>
-            </a:r>
-            <a:r>
-              <a:rPr lang="de-DE" dirty="0" err="1"/>
-              <a:t>diagram</a:t>
-            </a:r>
-            <a:r>
-              <a:rPr lang="de-DE"/>
-              <a:t>: </a:t>
-            </a:r>
-            <a:r>
-              <a:rPr lang="de-DE">
-                <a:hlinkClick r:id="rId4"/>
+              <a:t>://</a:t>
+            </a:r>
+            <a:r>
+              <a:rPr lang="de-DE" sz="1800" dirty="0" smtClean="0">
+                <a:hlinkClick r:id="rId2"/>
               </a:rPr>
-              <a:t>https://github.com/nappydevelopment/docs/blob/master/svg/New%20Classdiagram.svg</a:t>
-            </a:r>
-            <a:endParaRPr lang="de-DE"/>
-          </a:p>
-          <a:p>
-            <a:pPr marL="0" indent="0">
-              <a:buNone/>
-            </a:pPr>
+              <a:t>193.196.7.27:8080/secure/RapidBoard.jspa?rapidView=8&amp;projectKey=NAP&amp;view=planning.nodetail</a:t>
+            </a:r>
+            <a:endParaRPr lang="de-DE" sz="1800" dirty="0" smtClean="0"/>
+          </a:p>
+          <a:p>
             <a:endParaRPr lang="de-DE" dirty="0" smtClean="0"/>
           </a:p>
         </p:txBody>
@@ -8608,10 +9190,92 @@
           </a:p>
         </p:txBody>
       </p:sp>
+      <p:pic>
+        <p:nvPicPr>
+          <p:cNvPr id="2050" name="Picture 2" descr="https://jira.atlassian.com/images/atlassian-jira-logo-large.png"/>
+          <p:cNvPicPr>
+            <a:picLocks noChangeAspect="1" noChangeArrowheads="1"/>
+          </p:cNvPicPr>
+          <p:nvPr/>
+        </p:nvPicPr>
+        <p:blipFill>
+          <a:blip r:embed="rId3">
+            <a:extLst>
+              <a:ext uri="{28A0092B-C50C-407E-A947-70E740481C1C}">
+                <a14:useLocalDpi xmlns:a14="http://schemas.microsoft.com/office/drawing/2010/main" val="0"/>
+              </a:ext>
+            </a:extLst>
+          </a:blip>
+          <a:srcRect/>
+          <a:stretch>
+            <a:fillRect/>
+          </a:stretch>
+        </p:blipFill>
+        <p:spPr bwMode="auto">
+          <a:xfrm>
+            <a:off x="4978140" y="1964417"/>
+            <a:ext cx="2235720" cy="876753"/>
+          </a:xfrm>
+          <a:prstGeom prst="rect">
+            <a:avLst/>
+          </a:prstGeom>
+          <a:noFill/>
+          <a:extLst>
+            <a:ext uri="{909E8E84-426E-40DD-AFC4-6F175D3DCCD1}">
+              <a14:hiddenFill xmlns:a14="http://schemas.microsoft.com/office/drawing/2010/main">
+                <a:solidFill>
+                  <a:srgbClr val="FFFFFF"/>
+                </a:solidFill>
+              </a14:hiddenFill>
+            </a:ext>
+          </a:extLst>
+        </p:spPr>
+      </p:pic>
+      <p:pic>
+        <p:nvPicPr>
+          <p:cNvPr id="2051" name="Picture 3" descr="C:\Users\mincekara\Desktop\2015-12-09 12_56_23-Nappy, the ingenious - Agile Board - JIRA.png"/>
+          <p:cNvPicPr>
+            <a:picLocks noChangeAspect="1" noChangeArrowheads="1"/>
+          </p:cNvPicPr>
+          <p:nvPr/>
+        </p:nvPicPr>
+        <p:blipFill>
+          <a:blip r:embed="rId4">
+            <a:extLst>
+              <a:ext uri="{28A0092B-C50C-407E-A947-70E740481C1C}">
+                <a14:useLocalDpi xmlns:a14="http://schemas.microsoft.com/office/drawing/2010/main" val="0"/>
+              </a:ext>
+            </a:extLst>
+          </a:blip>
+          <a:srcRect/>
+          <a:stretch>
+            <a:fillRect/>
+          </a:stretch>
+        </p:blipFill>
+        <p:spPr bwMode="auto">
+          <a:xfrm>
+            <a:off x="458169" y="3000750"/>
+            <a:ext cx="11275662" cy="2830087"/>
+          </a:xfrm>
+          <a:prstGeom prst="rect">
+            <a:avLst/>
+          </a:prstGeom>
+          <a:noFill/>
+          <a:extLst>
+            <a:ext uri="{909E8E84-426E-40DD-AFC4-6F175D3DCCD1}">
+              <a14:hiddenFill xmlns:a14="http://schemas.microsoft.com/office/drawing/2010/main">
+                <a:solidFill>
+                  <a:srgbClr val="FFFFFF"/>
+                </a:solidFill>
+              </a14:hiddenFill>
+            </a:ext>
+          </a:extLst>
+        </p:spPr>
+      </p:pic>
     </p:spTree>
     <p:extLst>
       <p:ext uri="{BB962C8B-B14F-4D97-AF65-F5344CB8AC3E}">
-        <p14:creationId xmlns:p14="http://schemas.microsoft.com/office/powerpoint/2010/main" val="3717575877"/>
+        <p14:creationId xmlns:p14="http://schemas.microsoft.com/office/powerpoint/2010/main" val="1991744233"/>
       </p:ext>
     </p:extLst>
   </p:cSld>
@@ -8905,7 +9569,7 @@
   <a:extraClrSchemeLst/>
   <a:extLst>
     <a:ext uri="{05A4C25C-085E-4340-85A3-A5531E510DB2}">
-      <thm15:themeFamily xmlns:thm15="http://schemas.microsoft.com/office/thememl/2012/main" xmlns="" name="Retrospect" id="{5F128B03-DCCA-4EEB-AB3B-CF2899314A46}" vid="{3F1AAB62-24C6-49D2-8E01-B56FAC9A3DCD}"/>
+      <thm15:themeFamily xmlns="" xmlns:thm15="http://schemas.microsoft.com/office/thememl/2012/main" name="Retrospect" id="{5F128B03-DCCA-4EEB-AB3B-CF2899314A46}" vid="{3F1AAB62-24C6-49D2-8E01-B56FAC9A3DCD}"/>
     </a:ext>
   </a:extLst>
 </a:theme>
@@ -9166,7 +9830,7 @@
   <a:extraClrSchemeLst/>
   <a:extLst>
     <a:ext uri="{05A4C25C-085E-4340-85A3-A5531E510DB2}">
-      <thm15:themeFamily xmlns:thm15="http://schemas.microsoft.com/office/thememl/2012/main" xmlns="" name="Office Theme" id="{62F939B6-93AF-4DB8-9C6B-D6C7DFDC589F}" vid="{4A3C46E8-61CC-4603-A589-7422A47A8E4A}"/>
+      <thm15:themeFamily xmlns="" xmlns:thm15="http://schemas.microsoft.com/office/thememl/2012/main" name="Office Theme" id="{62F939B6-93AF-4DB8-9C6B-D6C7DFDC589F}" vid="{4A3C46E8-61CC-4603-A589-7422A47A8E4A}"/>
     </a:ext>
   </a:extLst>
 </a:theme>

</xml_diff>

<commit_message>
Final Version - MidtermPPP
</commit_message>
<xml_diff>
--- a/Midterm-PPP.pptx
+++ b/Midterm-PPP.pptx
@@ -18,8 +18,8 @@
     <p:sldId id="274" r:id="rId9"/>
     <p:sldId id="271" r:id="rId10"/>
     <p:sldId id="275" r:id="rId11"/>
-    <p:sldId id="264" r:id="rId12"/>
-    <p:sldId id="276" r:id="rId13"/>
+    <p:sldId id="276" r:id="rId12"/>
+    <p:sldId id="264" r:id="rId13"/>
     <p:sldId id="263" r:id="rId14"/>
     <p:sldId id="272" r:id="rId15"/>
     <p:sldId id="268" r:id="rId16"/>
@@ -125,7 +125,7 @@
   </p:defaultTextStyle>
   <p:extLst>
     <p:ext uri="{EFAFB233-063F-42B5-8137-9DF3F51BA10A}">
-      <p15:sldGuideLst xmlns="" xmlns:p15="http://schemas.microsoft.com/office/powerpoint/2012/main">
+      <p15:sldGuideLst xmlns:p15="http://schemas.microsoft.com/office/powerpoint/2012/main" xmlns="">
         <p15:guide id="1" orient="horz" pos="2160">
           <p15:clr>
             <a:srgbClr val="A4A3A4"/>
@@ -5457,8 +5457,132 @@
                   </a:schemeClr>
                 </a:solidFill>
               </a:rPr>
-              <a:t>CLASS </a:t>
-            </a:r>
+              <a:t>CLASS DIAGRAM &amp; ARCHITEKTUR</a:t>
+            </a:r>
+            <a:endParaRPr lang="de-DE" dirty="0">
+              <a:solidFill>
+                <a:schemeClr val="bg1">
+                  <a:lumMod val="50000"/>
+                </a:schemeClr>
+              </a:solidFill>
+            </a:endParaRPr>
+          </a:p>
+        </p:txBody>
+      </p:sp>
+      <p:sp>
+        <p:nvSpPr>
+          <p:cNvPr id="5" name="Foliennummernplatzhalter 4"/>
+          <p:cNvSpPr>
+            <a:spLocks noGrp="1"/>
+          </p:cNvSpPr>
+          <p:nvPr>
+            <p:ph type="sldNum" sz="quarter" idx="12"/>
+          </p:nvPr>
+        </p:nvSpPr>
+        <p:spPr/>
+        <p:txBody>
+          <a:bodyPr/>
+          <a:lstStyle/>
+          <a:p>
+            <a:fld id="{BEA2534F-1EDD-48ED-BC5A-02D188FC5C63}" type="slidenum">
+              <a:rPr lang="de-DE" smtClean="0"/>
+              <a:t>11</a:t>
+            </a:fld>
+            <a:endParaRPr lang="de-DE" dirty="0"/>
+          </a:p>
+        </p:txBody>
+      </p:sp>
+      <p:pic>
+        <p:nvPicPr>
+          <p:cNvPr id="1026" name="Picture 2" descr="C:\Users\mincekara\Desktop\2015-12-09 13_10_22-architektur.pdf - Foxit Reader.png"/>
+          <p:cNvPicPr>
+            <a:picLocks noChangeAspect="1" noChangeArrowheads="1"/>
+          </p:cNvPicPr>
+          <p:nvPr/>
+        </p:nvPicPr>
+        <p:blipFill rotWithShape="1">
+          <a:blip r:embed="rId3">
+            <a:extLst>
+              <a:ext uri="{28A0092B-C50C-407E-A947-70E740481C1C}">
+                <a14:useLocalDpi xmlns:a14="http://schemas.microsoft.com/office/drawing/2010/main" val="0"/>
+              </a:ext>
+            </a:extLst>
+          </a:blip>
+          <a:srcRect l="953" t="2860" b="2586"/>
+          <a:stretch/>
+        </p:blipFill>
+        <p:spPr bwMode="auto">
+          <a:xfrm>
+            <a:off x="2095103" y="1926772"/>
+            <a:ext cx="8001794" cy="3755572"/>
+          </a:xfrm>
+          <a:prstGeom prst="rect">
+            <a:avLst/>
+          </a:prstGeom>
+          <a:noFill/>
+          <a:extLst>
+            <a:ext uri="{909E8E84-426E-40DD-AFC4-6F175D3DCCD1}">
+              <a14:hiddenFill xmlns:a14="http://schemas.microsoft.com/office/drawing/2010/main">
+                <a:solidFill>
+                  <a:srgbClr val="FFFFFF"/>
+                </a:solidFill>
+              </a14:hiddenFill>
+            </a:ext>
+          </a:extLst>
+        </p:spPr>
+      </p:pic>
+    </p:spTree>
+    <p:extLst>
+      <p:ext uri="{BB962C8B-B14F-4D97-AF65-F5344CB8AC3E}">
+        <p14:creationId xmlns:p14="http://schemas.microsoft.com/office/powerpoint/2010/main" val="2627783732"/>
+      </p:ext>
+    </p:extLst>
+  </p:cSld>
+  <p:clrMapOvr>
+    <a:masterClrMapping/>
+  </p:clrMapOvr>
+  <p:timing>
+    <p:tnLst>
+      <p:par>
+        <p:cTn id="1" dur="indefinite" restart="never" nodeType="tmRoot"/>
+      </p:par>
+    </p:tnLst>
+  </p:timing>
+</p:sld>
+</file>
+
+<file path=ppt/slides/slide12.xml><?xml version="1.0" encoding="utf-8"?>
+<p:sld xmlns:a="http://schemas.openxmlformats.org/drawingml/2006/main" xmlns:r="http://schemas.openxmlformats.org/officeDocument/2006/relationships" xmlns:p="http://schemas.openxmlformats.org/presentationml/2006/main">
+  <p:cSld>
+    <p:spTree>
+      <p:nvGrpSpPr>
+        <p:cNvPr id="1" name=""/>
+        <p:cNvGrpSpPr/>
+        <p:nvPr/>
+      </p:nvGrpSpPr>
+      <p:grpSpPr>
+        <a:xfrm>
+          <a:off x="0" y="0"/>
+          <a:ext cx="0" cy="0"/>
+          <a:chOff x="0" y="0"/>
+          <a:chExt cx="0" cy="0"/>
+        </a:xfrm>
+      </p:grpSpPr>
+      <p:sp>
+        <p:nvSpPr>
+          <p:cNvPr id="2" name="Titel 1"/>
+          <p:cNvSpPr>
+            <a:spLocks noGrp="1"/>
+          </p:cNvSpPr>
+          <p:nvPr>
+            <p:ph type="title"/>
+          </p:nvPr>
+        </p:nvSpPr>
+        <p:spPr/>
+        <p:txBody>
+          <a:bodyPr/>
+          <a:lstStyle/>
+          <a:p>
             <a:r>
               <a:rPr lang="de-DE" dirty="0" smtClean="0">
                 <a:solidFill>
@@ -5467,7 +5591,7 @@
                   </a:schemeClr>
                 </a:solidFill>
               </a:rPr>
-              <a:t>DIAGRAM &amp; ARCHITEKTUR</a:t>
+              <a:t>CLASS DIAGRAM &amp; ARCHITEKTUR</a:t>
             </a:r>
             <a:endParaRPr lang="de-DE" dirty="0">
               <a:solidFill>
@@ -5496,7 +5620,7 @@
           <a:p>
             <a:fld id="{BEA2534F-1EDD-48ED-BC5A-02D188FC5C63}" type="slidenum">
               <a:rPr lang="de-DE" smtClean="0"/>
-              <a:t>11</a:t>
+              <a:t>12</a:t>
             </a:fld>
             <a:endParaRPr lang="de-DE" dirty="0"/>
           </a:p>
@@ -5590,133 +5714,6 @@
     <p:extLst>
       <p:ext uri="{BB962C8B-B14F-4D97-AF65-F5344CB8AC3E}">
         <p14:creationId xmlns:p14="http://schemas.microsoft.com/office/powerpoint/2010/main" val="3717575877"/>
-      </p:ext>
-    </p:extLst>
-  </p:cSld>
-  <p:clrMapOvr>
-    <a:masterClrMapping/>
-  </p:clrMapOvr>
-  <p:timing>
-    <p:tnLst>
-      <p:par>
-        <p:cTn id="1" dur="indefinite" restart="never" nodeType="tmRoot"/>
-      </p:par>
-    </p:tnLst>
-  </p:timing>
-</p:sld>
-</file>
-
-<file path=ppt/slides/slide12.xml><?xml version="1.0" encoding="utf-8"?>
-<p:sld xmlns:a="http://schemas.openxmlformats.org/drawingml/2006/main" xmlns:r="http://schemas.openxmlformats.org/officeDocument/2006/relationships" xmlns:p="http://schemas.openxmlformats.org/presentationml/2006/main">
-  <p:cSld>
-    <p:spTree>
-      <p:nvGrpSpPr>
-        <p:cNvPr id="1" name=""/>
-        <p:cNvGrpSpPr/>
-        <p:nvPr/>
-      </p:nvGrpSpPr>
-      <p:grpSpPr>
-        <a:xfrm>
-          <a:off x="0" y="0"/>
-          <a:ext cx="0" cy="0"/>
-          <a:chOff x="0" y="0"/>
-          <a:chExt cx="0" cy="0"/>
-        </a:xfrm>
-      </p:grpSpPr>
-      <p:sp>
-        <p:nvSpPr>
-          <p:cNvPr id="2" name="Titel 1"/>
-          <p:cNvSpPr>
-            <a:spLocks noGrp="1"/>
-          </p:cNvSpPr>
-          <p:nvPr>
-            <p:ph type="title"/>
-          </p:nvPr>
-        </p:nvSpPr>
-        <p:spPr/>
-        <p:txBody>
-          <a:bodyPr/>
-          <a:lstStyle/>
-          <a:p>
-            <a:r>
-              <a:rPr lang="de-DE" dirty="0" smtClean="0">
-                <a:solidFill>
-                  <a:schemeClr val="bg1">
-                    <a:lumMod val="50000"/>
-                  </a:schemeClr>
-                </a:solidFill>
-              </a:rPr>
-              <a:t>CLASS </a:t>
-            </a:r>
-            <a:r>
-              <a:rPr lang="de-DE" dirty="0" smtClean="0">
-                <a:solidFill>
-                  <a:schemeClr val="bg1">
-                    <a:lumMod val="50000"/>
-                  </a:schemeClr>
-                </a:solidFill>
-              </a:rPr>
-              <a:t>DIAGRAM &amp; ARCHITEKTUR</a:t>
-            </a:r>
-            <a:endParaRPr lang="de-DE" dirty="0">
-              <a:solidFill>
-                <a:schemeClr val="bg1">
-                  <a:lumMod val="50000"/>
-                </a:schemeClr>
-              </a:solidFill>
-            </a:endParaRPr>
-          </a:p>
-        </p:txBody>
-      </p:sp>
-      <p:sp>
-        <p:nvSpPr>
-          <p:cNvPr id="3" name="Inhaltsplatzhalter 2"/>
-          <p:cNvSpPr>
-            <a:spLocks noGrp="1"/>
-          </p:cNvSpPr>
-          <p:nvPr>
-            <p:ph idx="1"/>
-          </p:nvPr>
-        </p:nvSpPr>
-        <p:spPr/>
-        <p:txBody>
-          <a:bodyPr/>
-          <a:lstStyle/>
-          <a:p>
-            <a:pPr marL="0" indent="0">
-              <a:buNone/>
-            </a:pPr>
-            <a:endParaRPr lang="de-DE" dirty="0"/>
-          </a:p>
-        </p:txBody>
-      </p:sp>
-      <p:sp>
-        <p:nvSpPr>
-          <p:cNvPr id="5" name="Foliennummernplatzhalter 4"/>
-          <p:cNvSpPr>
-            <a:spLocks noGrp="1"/>
-          </p:cNvSpPr>
-          <p:nvPr>
-            <p:ph type="sldNum" sz="quarter" idx="12"/>
-          </p:nvPr>
-        </p:nvSpPr>
-        <p:spPr/>
-        <p:txBody>
-          <a:bodyPr/>
-          <a:lstStyle/>
-          <a:p>
-            <a:fld id="{BEA2534F-1EDD-48ED-BC5A-02D188FC5C63}" type="slidenum">
-              <a:rPr lang="de-DE" smtClean="0"/>
-              <a:t>12</a:t>
-            </a:fld>
-            <a:endParaRPr lang="de-DE" dirty="0"/>
-          </a:p>
-        </p:txBody>
-      </p:sp>
-    </p:spTree>
-    <p:extLst>
-      <p:ext uri="{BB962C8B-B14F-4D97-AF65-F5344CB8AC3E}">
-        <p14:creationId xmlns:p14="http://schemas.microsoft.com/office/powerpoint/2010/main" val="2627783732"/>
       </p:ext>
     </p:extLst>
   </p:cSld>
@@ -6898,13 +6895,8 @@
             </a:pPr>
             <a:r>
               <a:rPr lang="de-DE" dirty="0" smtClean="0"/>
-              <a:t>Class </a:t>
-            </a:r>
-            <a:r>
-              <a:rPr lang="de-DE" dirty="0" smtClean="0"/>
-              <a:t>Diagramm &amp; Architektur</a:t>
-            </a:r>
-            <a:endParaRPr lang="de-DE" dirty="0" smtClean="0"/>
+              <a:t>Class Diagramm &amp; Architektur</a:t>
+            </a:r>
           </a:p>
           <a:p>
             <a:pPr marL="749808" lvl="1" indent="-457200">
@@ -9569,7 +9561,7 @@
   <a:extraClrSchemeLst/>
   <a:extLst>
     <a:ext uri="{05A4C25C-085E-4340-85A3-A5531E510DB2}">
-      <thm15:themeFamily xmlns="" xmlns:thm15="http://schemas.microsoft.com/office/thememl/2012/main" name="Retrospect" id="{5F128B03-DCCA-4EEB-AB3B-CF2899314A46}" vid="{3F1AAB62-24C6-49D2-8E01-B56FAC9A3DCD}"/>
+      <thm15:themeFamily xmlns:thm15="http://schemas.microsoft.com/office/thememl/2012/main" xmlns="" name="Retrospect" id="{5F128B03-DCCA-4EEB-AB3B-CF2899314A46}" vid="{3F1AAB62-24C6-49D2-8E01-B56FAC9A3DCD}"/>
     </a:ext>
   </a:extLst>
 </a:theme>
@@ -9830,7 +9822,7 @@
   <a:extraClrSchemeLst/>
   <a:extLst>
     <a:ext uri="{05A4C25C-085E-4340-85A3-A5531E510DB2}">
-      <thm15:themeFamily xmlns="" xmlns:thm15="http://schemas.microsoft.com/office/thememl/2012/main" name="Office Theme" id="{62F939B6-93AF-4DB8-9C6B-D6C7DFDC589F}" vid="{4A3C46E8-61CC-4603-A589-7422A47A8E4A}"/>
+      <thm15:themeFamily xmlns:thm15="http://schemas.microsoft.com/office/thememl/2012/main" xmlns="" name="Office Theme" id="{62F939B6-93AF-4DB8-9C6B-D6C7DFDC589F}" vid="{4A3C46E8-61CC-4603-A589-7422A47A8E4A}"/>
     </a:ext>
   </a:extLst>
 </a:theme>

</xml_diff>